<commit_message>
Import from and push to GitHub inEclipse
Added section about import from and push to GitHub in Eclipse
</commit_message>
<xml_diff>
--- a/Lesson 2.pptx
+++ b/Lesson 2.pptx
@@ -5,7 +5,7 @@
     <p:sldMasterId id="2147483648" r:id="rId1"/>
   </p:sldMasterIdLst>
   <p:notesMasterIdLst>
-    <p:notesMasterId r:id="rId31"/>
+    <p:notesMasterId r:id="rId53"/>
   </p:notesMasterIdLst>
   <p:sldIdLst>
     <p:sldId id="257" r:id="rId2"/>
@@ -37,6 +37,28 @@
     <p:sldId id="273" r:id="rId28"/>
     <p:sldId id="284" r:id="rId29"/>
     <p:sldId id="285" r:id="rId30"/>
+    <p:sldId id="286" r:id="rId31"/>
+    <p:sldId id="287" r:id="rId32"/>
+    <p:sldId id="288" r:id="rId33"/>
+    <p:sldId id="289" r:id="rId34"/>
+    <p:sldId id="290" r:id="rId35"/>
+    <p:sldId id="291" r:id="rId36"/>
+    <p:sldId id="292" r:id="rId37"/>
+    <p:sldId id="293" r:id="rId38"/>
+    <p:sldId id="294" r:id="rId39"/>
+    <p:sldId id="295" r:id="rId40"/>
+    <p:sldId id="296" r:id="rId41"/>
+    <p:sldId id="297" r:id="rId42"/>
+    <p:sldId id="298" r:id="rId43"/>
+    <p:sldId id="299" r:id="rId44"/>
+    <p:sldId id="300" r:id="rId45"/>
+    <p:sldId id="301" r:id="rId46"/>
+    <p:sldId id="302" r:id="rId47"/>
+    <p:sldId id="303" r:id="rId48"/>
+    <p:sldId id="304" r:id="rId49"/>
+    <p:sldId id="305" r:id="rId50"/>
+    <p:sldId id="306" r:id="rId51"/>
+    <p:sldId id="307" r:id="rId52"/>
   </p:sldIdLst>
   <p:sldSz cx="9144000" cy="6858000" type="screen4x3"/>
   <p:notesSz cx="6858000" cy="9144000"/>
@@ -220,7 +242,7 @@
           <a:p>
             <a:fld id="{F54CB45B-72AD-4552-B8CB-4603423A3819}" type="datetimeFigureOut">
               <a:rPr lang="en-US" smtClean="0"/>
-              <a:t>4/28/2014</a:t>
+              <a:t>5/2/2014</a:t>
             </a:fld>
             <a:endParaRPr lang="en-US"/>
           </a:p>
@@ -936,7 +958,7 @@
           <a:p>
             <a:fld id="{754A55E3-EBBC-40EC-8285-A5F7E23B333B}" type="datetime2">
               <a:rPr lang="en-US" smtClean="0"/>
-              <a:t>Monday, April 28, 2014</a:t>
+              <a:t>Friday, May 02, 2014</a:t>
             </a:fld>
             <a:endParaRPr lang="en-US" dirty="0"/>
           </a:p>
@@ -1121,7 +1143,7 @@
           <a:p>
             <a:fld id="{BE3229D3-2544-4AF2-A783-2865E8C85850}" type="datetime2">
               <a:rPr lang="en-US" smtClean="0"/>
-              <a:t>Monday, April 28, 2014</a:t>
+              <a:t>Friday, May 02, 2014</a:t>
             </a:fld>
             <a:endParaRPr lang="en-US" dirty="0"/>
           </a:p>
@@ -1305,7 +1327,7 @@
           <a:p>
             <a:fld id="{1868F6D7-D473-43FD-867C-355F7580CEC0}" type="datetime2">
               <a:rPr lang="en-US" smtClean="0"/>
-              <a:t>Monday, April 28, 2014</a:t>
+              <a:t>Friday, May 02, 2014</a:t>
             </a:fld>
             <a:endParaRPr lang="en-US" dirty="0"/>
           </a:p>
@@ -1479,7 +1501,7 @@
           <a:p>
             <a:fld id="{A2A5E575-F730-4674-9978-37F7AD0A2F99}" type="datetime2">
               <a:rPr lang="en-US" smtClean="0"/>
-              <a:t>Monday, April 28, 2014</a:t>
+              <a:t>Friday, May 02, 2014</a:t>
             </a:fld>
             <a:endParaRPr lang="en-US" dirty="0"/>
           </a:p>
@@ -1736,7 +1758,7 @@
           <a:p>
             <a:fld id="{A4BC6588-65C8-41FC-B123-1600C765897E}" type="datetime2">
               <a:rPr lang="en-US" smtClean="0"/>
-              <a:t>Monday, April 28, 2014</a:t>
+              <a:t>Friday, May 02, 2014</a:t>
             </a:fld>
             <a:endParaRPr lang="en-US" dirty="0"/>
           </a:p>
@@ -2035,7 +2057,7 @@
           <a:p>
             <a:fld id="{8145299E-F4A6-440E-909C-2F6C646D3553}" type="datetime2">
               <a:rPr lang="en-US" smtClean="0"/>
-              <a:t>Monday, April 28, 2014</a:t>
+              <a:t>Friday, May 02, 2014</a:t>
             </a:fld>
             <a:endParaRPr lang="en-US" dirty="0"/>
           </a:p>
@@ -2461,7 +2483,7 @@
           <a:p>
             <a:fld id="{B23F0F10-84F1-4CB1-9F5E-D7D726B6377A}" type="datetime2">
               <a:rPr lang="en-US" smtClean="0"/>
-              <a:t>Monday, April 28, 2014</a:t>
+              <a:t>Friday, May 02, 2014</a:t>
             </a:fld>
             <a:endParaRPr lang="en-US" dirty="0"/>
           </a:p>
@@ -2583,7 +2605,7 @@
           <a:p>
             <a:fld id="{C04B6024-2702-49B2-98BA-BAE3D8979AA9}" type="datetime2">
               <a:rPr lang="en-US" smtClean="0"/>
-              <a:t>Monday, April 28, 2014</a:t>
+              <a:t>Friday, May 02, 2014</a:t>
             </a:fld>
             <a:endParaRPr lang="en-US" dirty="0"/>
           </a:p>
@@ -2682,7 +2704,7 @@
           <a:p>
             <a:fld id="{BDFBC1D7-5241-44C2-8E90-8FA114211796}" type="datetime2">
               <a:rPr lang="en-US" smtClean="0"/>
-              <a:t>Monday, April 28, 2014</a:t>
+              <a:t>Friday, May 02, 2014</a:t>
             </a:fld>
             <a:endParaRPr lang="en-US" dirty="0"/>
           </a:p>
@@ -2963,7 +2985,7 @@
           <a:p>
             <a:fld id="{9BCDA9D6-1455-40C9-A4EF-D1A2E44083E9}" type="datetime2">
               <a:rPr lang="en-US" smtClean="0"/>
-              <a:t>Monday, April 28, 2014</a:t>
+              <a:t>Friday, May 02, 2014</a:t>
             </a:fld>
             <a:endParaRPr lang="en-US" dirty="0"/>
           </a:p>
@@ -3220,7 +3242,7 @@
           <a:p>
             <a:fld id="{6DC6CD8D-2CBA-4D9B-B9FF-3CBE779CDB90}" type="datetime2">
               <a:rPr lang="en-US" smtClean="0"/>
-              <a:t>Monday, April 28, 2014</a:t>
+              <a:t>Friday, May 02, 2014</a:t>
             </a:fld>
             <a:endParaRPr lang="en-US" dirty="0"/>
           </a:p>
@@ -3447,7 +3469,7 @@
           <a:p>
             <a:fld id="{ED4BD17F-53A8-40C3-944A-73F679BFCB25}" type="datetime2">
               <a:rPr lang="en-US" smtClean="0"/>
-              <a:t>Monday, April 28, 2014</a:t>
+              <a:t>Friday, May 02, 2014</a:t>
             </a:fld>
             <a:endParaRPr lang="en-US" dirty="0"/>
           </a:p>
@@ -4083,7 +4105,7 @@
           <a:p>
             <a:fld id="{F5331F5E-BFEB-4C82-82E4-197D9AD08E08}" type="datetime2">
               <a:rPr lang="en-US" smtClean="0"/>
-              <a:t>Monday, April 28, 2014</a:t>
+              <a:t>Friday, May 02, 2014</a:t>
             </a:fld>
             <a:endParaRPr lang="en-US" dirty="0"/>
           </a:p>
@@ -4266,7 +4288,7 @@
           <a:p>
             <a:fld id="{856EEEFA-25DB-4FA5-9452-8561F35F2333}" type="datetime2">
               <a:rPr lang="en-US" smtClean="0"/>
-              <a:t>Monday, April 28, 2014</a:t>
+              <a:t>Friday, May 02, 2014</a:t>
             </a:fld>
             <a:endParaRPr lang="en-US" dirty="0"/>
           </a:p>
@@ -4491,7 +4513,7 @@
           <a:p>
             <a:fld id="{9A8F8D9D-AE75-40E7-862F-DADD901D0145}" type="datetime2">
               <a:rPr lang="en-US" smtClean="0"/>
-              <a:t>Monday, April 28, 2014</a:t>
+              <a:t>Friday, May 02, 2014</a:t>
             </a:fld>
             <a:endParaRPr lang="en-US" dirty="0"/>
           </a:p>
@@ -4716,7 +4738,7 @@
           <a:p>
             <a:fld id="{4F10C180-3EE6-480E-AEB0-503F40344379}" type="datetime2">
               <a:rPr lang="en-US" smtClean="0"/>
-              <a:t>Monday, April 28, 2014</a:t>
+              <a:t>Friday, May 02, 2014</a:t>
             </a:fld>
             <a:endParaRPr lang="en-US" dirty="0"/>
           </a:p>
@@ -4995,7 +5017,7 @@
           <a:p>
             <a:fld id="{982CF03F-C230-4358-A7A7-B40F9616CE6E}" type="datetime2">
               <a:rPr lang="en-US" smtClean="0"/>
-              <a:t>Monday, April 28, 2014</a:t>
+              <a:t>Friday, May 02, 2014</a:t>
             </a:fld>
             <a:endParaRPr lang="en-US" dirty="0"/>
           </a:p>
@@ -5216,7 +5238,7 @@
           <a:p>
             <a:fld id="{E919F0F1-8BEA-4204-B6B0-A00DECFA03BA}" type="datetime2">
               <a:rPr lang="en-US" smtClean="0"/>
-              <a:t>Monday, April 28, 2014</a:t>
+              <a:t>Friday, May 02, 2014</a:t>
             </a:fld>
             <a:endParaRPr lang="en-US" dirty="0"/>
           </a:p>
@@ -5440,7 +5462,7 @@
           <a:p>
             <a:fld id="{E3F12646-0731-4D82-94BA-667D7B073B80}" type="datetime2">
               <a:rPr lang="en-US" smtClean="0"/>
-              <a:t>Monday, April 28, 2014</a:t>
+              <a:t>Friday, May 02, 2014</a:t>
             </a:fld>
             <a:endParaRPr lang="en-US" dirty="0"/>
           </a:p>
@@ -5747,7 +5769,7 @@
           <a:p>
             <a:fld id="{D24F3D07-7DD3-496D-8F65-E930B1B4BC2D}" type="datetime2">
               <a:rPr lang="en-US" smtClean="0"/>
-              <a:t>Monday, April 28, 2014</a:t>
+              <a:t>Friday, May 02, 2014</a:t>
             </a:fld>
             <a:endParaRPr lang="en-US" dirty="0"/>
           </a:p>
@@ -5876,7 +5898,7 @@
           <a:p>
             <a:fld id="{C04B6024-2702-49B2-98BA-BAE3D8979AA9}" type="datetime2">
               <a:rPr lang="en-US" smtClean="0"/>
-              <a:t>Monday, April 28, 2014</a:t>
+              <a:t>Friday, May 02, 2014</a:t>
             </a:fld>
             <a:endParaRPr lang="en-US" dirty="0"/>
           </a:p>
@@ -6118,7 +6140,7 @@
           <a:p>
             <a:fld id="{A2A5E575-F730-4674-9978-37F7AD0A2F99}" type="datetime2">
               <a:rPr lang="en-US" smtClean="0"/>
-              <a:t>Monday, April 28, 2014</a:t>
+              <a:t>Friday, May 02, 2014</a:t>
             </a:fld>
             <a:endParaRPr lang="en-US" dirty="0"/>
           </a:p>
@@ -6247,7 +6269,7 @@
           <a:p>
             <a:fld id="{C04B6024-2702-49B2-98BA-BAE3D8979AA9}" type="datetime2">
               <a:rPr lang="en-US" smtClean="0"/>
-              <a:t>Monday, April 28, 2014</a:t>
+              <a:t>Friday, May 02, 2014</a:t>
             </a:fld>
             <a:endParaRPr lang="en-US" dirty="0"/>
           </a:p>
@@ -6740,7 +6762,7 @@
           <a:p>
             <a:fld id="{B35EA6BA-2020-49E1-9871-1CBA864BFA1D}" type="datetime2">
               <a:rPr lang="en-US" smtClean="0"/>
-              <a:t>Monday, April 28, 2014</a:t>
+              <a:t>Friday, May 02, 2014</a:t>
             </a:fld>
             <a:endParaRPr lang="en-US" dirty="0"/>
           </a:p>
@@ -6968,7 +6990,7 @@
           <a:p>
             <a:fld id="{42D7A74B-B279-4203-87CE-D35E59BD6D2D}" type="datetime2">
               <a:rPr lang="en-US" smtClean="0"/>
-              <a:t>Monday, April 28, 2014</a:t>
+              <a:t>Friday, May 02, 2014</a:t>
             </a:fld>
             <a:endParaRPr lang="en-US" dirty="0"/>
           </a:p>
@@ -7097,7 +7119,7 @@
           <a:p>
             <a:fld id="{C04B6024-2702-49B2-98BA-BAE3D8979AA9}" type="datetime2">
               <a:rPr lang="en-US" smtClean="0"/>
-              <a:t>Monday, April 28, 2014</a:t>
+              <a:t>Friday, May 02, 2014</a:t>
             </a:fld>
             <a:endParaRPr lang="en-US" dirty="0"/>
           </a:p>
@@ -7280,7 +7302,7 @@
           <a:p>
             <a:fld id="{2790549F-49A7-47EE-94CF-6E3D0D276773}" type="datetime2">
               <a:rPr lang="en-US" smtClean="0"/>
-              <a:t>Monday, April 28, 2014</a:t>
+              <a:t>Friday, May 02, 2014</a:t>
             </a:fld>
             <a:endParaRPr lang="en-US" dirty="0"/>
           </a:p>
@@ -7535,7 +7557,7 @@
           <a:p>
             <a:fld id="{171408A9-A6D8-4827-AB69-EE2BB6926CB9}" type="datetime2">
               <a:rPr lang="en-US" smtClean="0"/>
-              <a:t>Monday, April 28, 2014</a:t>
+              <a:t>Friday, May 02, 2014</a:t>
             </a:fld>
             <a:endParaRPr lang="en-US" dirty="0"/>
           </a:p>
@@ -7727,7 +7749,7 @@
           <a:p>
             <a:fld id="{171408A9-A6D8-4827-AB69-EE2BB6926CB9}" type="datetime2">
               <a:rPr lang="en-US" smtClean="0"/>
-              <a:t>Monday, April 28, 2014</a:t>
+              <a:t>Friday, May 02, 2014</a:t>
             </a:fld>
             <a:endParaRPr lang="en-US" dirty="0"/>
           </a:p>
@@ -7919,7 +7941,7 @@
           <a:p>
             <a:fld id="{171408A9-A6D8-4827-AB69-EE2BB6926CB9}" type="datetime2">
               <a:rPr lang="en-US" smtClean="0"/>
-              <a:t>Monday, April 28, 2014</a:t>
+              <a:t>Friday, May 02, 2014</a:t>
             </a:fld>
             <a:endParaRPr lang="en-US" dirty="0"/>
           </a:p>
@@ -8111,7 +8133,7 @@
           <a:p>
             <a:fld id="{171408A9-A6D8-4827-AB69-EE2BB6926CB9}" type="datetime2">
               <a:rPr lang="en-US" smtClean="0"/>
-              <a:t>Monday, April 28, 2014</a:t>
+              <a:t>Friday, May 02, 2014</a:t>
             </a:fld>
             <a:endParaRPr lang="en-US" dirty="0"/>
           </a:p>
@@ -8574,7 +8596,7 @@
           <a:p>
             <a:fld id="{171408A9-A6D8-4827-AB69-EE2BB6926CB9}" type="datetime2">
               <a:rPr lang="en-US" smtClean="0"/>
-              <a:t>Monday, April 28, 2014</a:t>
+              <a:t>Friday, May 02, 2014</a:t>
             </a:fld>
             <a:endParaRPr lang="en-US" dirty="0"/>
           </a:p>
@@ -8994,7 +9016,7 @@
           <a:p>
             <a:fld id="{A2A5E575-F730-4674-9978-37F7AD0A2F99}" type="datetime2">
               <a:rPr lang="en-US" smtClean="0"/>
-              <a:t>Monday, April 28, 2014</a:t>
+              <a:t>Friday, May 02, 2014</a:t>
             </a:fld>
             <a:endParaRPr lang="en-US" dirty="0"/>
           </a:p>
@@ -9123,7 +9145,7 @@
           <a:p>
             <a:fld id="{C04B6024-2702-49B2-98BA-BAE3D8979AA9}" type="datetime2">
               <a:rPr lang="en-US" smtClean="0"/>
-              <a:t>Monday, April 28, 2014</a:t>
+              <a:t>Friday, May 02, 2014</a:t>
             </a:fld>
             <a:endParaRPr lang="en-US" dirty="0"/>
           </a:p>
@@ -9306,7 +9328,7 @@
           <a:p>
             <a:fld id="{C04B6024-2702-49B2-98BA-BAE3D8979AA9}" type="datetime2">
               <a:rPr lang="en-US" smtClean="0"/>
-              <a:t>Monday, April 28, 2014</a:t>
+              <a:t>Friday, May 02, 2014</a:t>
             </a:fld>
             <a:endParaRPr lang="en-US" dirty="0"/>
           </a:p>
@@ -9432,6 +9454,1936 @@
 </p:sld>
 </file>
 
+<file path=ppt/slides/slide30.xml><?xml version="1.0" encoding="utf-8"?>
+<p:sld xmlns:a="http://schemas.openxmlformats.org/drawingml/2006/main" xmlns:r="http://schemas.openxmlformats.org/officeDocument/2006/relationships" xmlns:p="http://schemas.openxmlformats.org/presentationml/2006/main">
+  <p:cSld>
+    <p:spTree>
+      <p:nvGrpSpPr>
+        <p:cNvPr id="1" name=""/>
+        <p:cNvGrpSpPr/>
+        <p:nvPr/>
+      </p:nvGrpSpPr>
+      <p:grpSpPr>
+        <a:xfrm>
+          <a:off x="0" y="0"/>
+          <a:ext cx="0" cy="0"/>
+          <a:chOff x="0" y="0"/>
+          <a:chExt cx="0" cy="0"/>
+        </a:xfrm>
+      </p:grpSpPr>
+      <p:sp>
+        <p:nvSpPr>
+          <p:cNvPr id="2" name="Title 1"/>
+          <p:cNvSpPr>
+            <a:spLocks noGrp="1"/>
+          </p:cNvSpPr>
+          <p:nvPr>
+            <p:ph type="title"/>
+          </p:nvPr>
+        </p:nvSpPr>
+        <p:spPr/>
+        <p:txBody>
+          <a:bodyPr/>
+          <a:lstStyle/>
+          <a:p>
+            <a:r>
+              <a:rPr lang="en-US" dirty="0" smtClean="0"/>
+              <a:t>Assignment</a:t>
+            </a:r>
+            <a:endParaRPr lang="en-US" dirty="0"/>
+          </a:p>
+        </p:txBody>
+      </p:sp>
+      <p:sp>
+        <p:nvSpPr>
+          <p:cNvPr id="3" name="Content Placeholder 2"/>
+          <p:cNvSpPr>
+            <a:spLocks noGrp="1"/>
+          </p:cNvSpPr>
+          <p:nvPr>
+            <p:ph idx="1"/>
+          </p:nvPr>
+        </p:nvSpPr>
+        <p:spPr/>
+        <p:txBody>
+          <a:bodyPr/>
+          <a:lstStyle/>
+          <a:p>
+            <a:r>
+              <a:rPr lang="en-US" dirty="0" smtClean="0"/>
+              <a:t>Start developing your own project</a:t>
+            </a:r>
+          </a:p>
+          <a:p>
+            <a:r>
+              <a:rPr lang="en-US" dirty="0" smtClean="0"/>
+              <a:t>Create a description of the main features</a:t>
+            </a:r>
+          </a:p>
+          <a:p>
+            <a:r>
+              <a:rPr lang="en-US" dirty="0" smtClean="0"/>
+              <a:t>Push some code into the Sandbox repository under a folder with your </a:t>
+            </a:r>
+            <a:r>
+              <a:rPr lang="en-US" dirty="0" err="1" smtClean="0"/>
+              <a:t>GitHub</a:t>
+            </a:r>
+            <a:r>
+              <a:rPr lang="en-US" dirty="0" smtClean="0"/>
+              <a:t> user id.</a:t>
+            </a:r>
+          </a:p>
+          <a:p>
+            <a:endParaRPr lang="en-US" dirty="0"/>
+          </a:p>
+        </p:txBody>
+      </p:sp>
+      <p:sp>
+        <p:nvSpPr>
+          <p:cNvPr id="4" name="Date Placeholder 3"/>
+          <p:cNvSpPr>
+            <a:spLocks noGrp="1"/>
+          </p:cNvSpPr>
+          <p:nvPr>
+            <p:ph type="dt" sz="half" idx="10"/>
+          </p:nvPr>
+        </p:nvSpPr>
+        <p:spPr/>
+        <p:txBody>
+          <a:bodyPr/>
+          <a:lstStyle/>
+          <a:p>
+            <a:fld id="{A2A5E575-F730-4674-9978-37F7AD0A2F99}" type="datetime2">
+              <a:rPr lang="en-US" smtClean="0"/>
+              <a:t>Friday, May 02, 2014</a:t>
+            </a:fld>
+            <a:endParaRPr lang="en-US" dirty="0"/>
+          </a:p>
+        </p:txBody>
+      </p:sp>
+      <p:sp>
+        <p:nvSpPr>
+          <p:cNvPr id="5" name="Footer Placeholder 4"/>
+          <p:cNvSpPr>
+            <a:spLocks noGrp="1"/>
+          </p:cNvSpPr>
+          <p:nvPr>
+            <p:ph type="ftr" sz="quarter" idx="11"/>
+          </p:nvPr>
+        </p:nvSpPr>
+        <p:spPr/>
+        <p:txBody>
+          <a:bodyPr/>
+          <a:lstStyle/>
+          <a:p>
+            <a:r>
+              <a:rPr lang="en-US" smtClean="0"/>
+              <a:t>Palle Cogburn</a:t>
+            </a:r>
+            <a:endParaRPr lang="en-US" dirty="0"/>
+          </a:p>
+        </p:txBody>
+      </p:sp>
+      <p:sp>
+        <p:nvSpPr>
+          <p:cNvPr id="6" name="Slide Number Placeholder 5"/>
+          <p:cNvSpPr>
+            <a:spLocks noGrp="1"/>
+          </p:cNvSpPr>
+          <p:nvPr>
+            <p:ph type="sldNum" sz="quarter" idx="12"/>
+          </p:nvPr>
+        </p:nvSpPr>
+        <p:spPr/>
+        <p:txBody>
+          <a:bodyPr/>
+          <a:lstStyle/>
+          <a:p>
+            <a:fld id="{8CBEA7D5-4322-4BC9-B527-2F0B772A1C61}" type="slidenum">
+              <a:rPr lang="en-US" smtClean="0"/>
+              <a:t>30</a:t>
+            </a:fld>
+            <a:endParaRPr lang="en-US" dirty="0"/>
+          </a:p>
+        </p:txBody>
+      </p:sp>
+    </p:spTree>
+    <p:extLst>
+      <p:ext uri="{BB962C8B-B14F-4D97-AF65-F5344CB8AC3E}">
+        <p14:creationId xmlns:p14="http://schemas.microsoft.com/office/powerpoint/2010/main" val="1115645826"/>
+      </p:ext>
+    </p:extLst>
+  </p:cSld>
+  <p:clrMapOvr>
+    <a:masterClrMapping/>
+  </p:clrMapOvr>
+  <p:timing>
+    <p:tnLst>
+      <p:par>
+        <p:cTn id="1" dur="indefinite" restart="never" nodeType="tmRoot"/>
+      </p:par>
+    </p:tnLst>
+  </p:timing>
+</p:sld>
+</file>
+
+<file path=ppt/slides/slide31.xml><?xml version="1.0" encoding="utf-8"?>
+<p:sld xmlns:a="http://schemas.openxmlformats.org/drawingml/2006/main" xmlns:r="http://schemas.openxmlformats.org/officeDocument/2006/relationships" xmlns:p="http://schemas.openxmlformats.org/presentationml/2006/main">
+  <p:cSld>
+    <p:spTree>
+      <p:nvGrpSpPr>
+        <p:cNvPr id="1" name=""/>
+        <p:cNvGrpSpPr/>
+        <p:nvPr/>
+      </p:nvGrpSpPr>
+      <p:grpSpPr>
+        <a:xfrm>
+          <a:off x="0" y="0"/>
+          <a:ext cx="0" cy="0"/>
+          <a:chOff x="0" y="0"/>
+          <a:chExt cx="0" cy="0"/>
+        </a:xfrm>
+      </p:grpSpPr>
+      <p:sp>
+        <p:nvSpPr>
+          <p:cNvPr id="2" name="Title 1"/>
+          <p:cNvSpPr>
+            <a:spLocks noGrp="1"/>
+          </p:cNvSpPr>
+          <p:nvPr>
+            <p:ph type="title"/>
+          </p:nvPr>
+        </p:nvSpPr>
+        <p:spPr/>
+        <p:txBody>
+          <a:bodyPr/>
+          <a:lstStyle/>
+          <a:p>
+            <a:r>
+              <a:rPr lang="en-US" dirty="0" smtClean="0"/>
+              <a:t>Importing Sandbox</a:t>
+            </a:r>
+            <a:endParaRPr lang="en-US" dirty="0"/>
+          </a:p>
+        </p:txBody>
+      </p:sp>
+      <p:sp>
+        <p:nvSpPr>
+          <p:cNvPr id="3" name="Date Placeholder 2"/>
+          <p:cNvSpPr>
+            <a:spLocks noGrp="1"/>
+          </p:cNvSpPr>
+          <p:nvPr>
+            <p:ph type="dt" sz="half" idx="10"/>
+          </p:nvPr>
+        </p:nvSpPr>
+        <p:spPr/>
+        <p:txBody>
+          <a:bodyPr/>
+          <a:lstStyle/>
+          <a:p>
+            <a:fld id="{C04B6024-2702-49B2-98BA-BAE3D8979AA9}" type="datetime2">
+              <a:rPr lang="en-US" smtClean="0"/>
+              <a:t>Friday, May 02, 2014</a:t>
+            </a:fld>
+            <a:endParaRPr lang="en-US" dirty="0"/>
+          </a:p>
+        </p:txBody>
+      </p:sp>
+      <p:sp>
+        <p:nvSpPr>
+          <p:cNvPr id="4" name="Footer Placeholder 3"/>
+          <p:cNvSpPr>
+            <a:spLocks noGrp="1"/>
+          </p:cNvSpPr>
+          <p:nvPr>
+            <p:ph type="ftr" sz="quarter" idx="11"/>
+          </p:nvPr>
+        </p:nvSpPr>
+        <p:spPr/>
+        <p:txBody>
+          <a:bodyPr/>
+          <a:lstStyle/>
+          <a:p>
+            <a:r>
+              <a:rPr lang="en-US" smtClean="0"/>
+              <a:t>Palle Cogburn</a:t>
+            </a:r>
+            <a:endParaRPr lang="en-US" dirty="0"/>
+          </a:p>
+        </p:txBody>
+      </p:sp>
+      <p:sp>
+        <p:nvSpPr>
+          <p:cNvPr id="5" name="Slide Number Placeholder 4"/>
+          <p:cNvSpPr>
+            <a:spLocks noGrp="1"/>
+          </p:cNvSpPr>
+          <p:nvPr>
+            <p:ph type="sldNum" sz="quarter" idx="12"/>
+          </p:nvPr>
+        </p:nvSpPr>
+        <p:spPr/>
+        <p:txBody>
+          <a:bodyPr/>
+          <a:lstStyle/>
+          <a:p>
+            <a:fld id="{8CBEA7D5-4322-4BC9-B527-2F0B772A1C61}" type="slidenum">
+              <a:rPr lang="en-US" smtClean="0"/>
+              <a:t>31</a:t>
+            </a:fld>
+            <a:endParaRPr lang="en-US" dirty="0"/>
+          </a:p>
+        </p:txBody>
+      </p:sp>
+    </p:spTree>
+    <p:extLst>
+      <p:ext uri="{BB962C8B-B14F-4D97-AF65-F5344CB8AC3E}">
+        <p14:creationId xmlns:p14="http://schemas.microsoft.com/office/powerpoint/2010/main" val="492439735"/>
+      </p:ext>
+    </p:extLst>
+  </p:cSld>
+  <p:clrMapOvr>
+    <a:masterClrMapping/>
+  </p:clrMapOvr>
+  <p:timing>
+    <p:tnLst>
+      <p:par>
+        <p:cTn id="1" dur="indefinite" restart="never" nodeType="tmRoot"/>
+      </p:par>
+    </p:tnLst>
+  </p:timing>
+</p:sld>
+</file>
+
+<file path=ppt/slides/slide32.xml><?xml version="1.0" encoding="utf-8"?>
+<p:sld xmlns:a="http://schemas.openxmlformats.org/drawingml/2006/main" xmlns:r="http://schemas.openxmlformats.org/officeDocument/2006/relationships" xmlns:p="http://schemas.openxmlformats.org/presentationml/2006/main">
+  <p:cSld>
+    <p:spTree>
+      <p:nvGrpSpPr>
+        <p:cNvPr id="1" name=""/>
+        <p:cNvGrpSpPr/>
+        <p:nvPr/>
+      </p:nvGrpSpPr>
+      <p:grpSpPr>
+        <a:xfrm>
+          <a:off x="0" y="0"/>
+          <a:ext cx="0" cy="0"/>
+          <a:chOff x="0" y="0"/>
+          <a:chExt cx="0" cy="0"/>
+        </a:xfrm>
+      </p:grpSpPr>
+      <p:sp>
+        <p:nvSpPr>
+          <p:cNvPr id="2" name="Title 1"/>
+          <p:cNvSpPr>
+            <a:spLocks noGrp="1"/>
+          </p:cNvSpPr>
+          <p:nvPr>
+            <p:ph type="title"/>
+          </p:nvPr>
+        </p:nvSpPr>
+        <p:spPr/>
+        <p:txBody>
+          <a:bodyPr/>
+          <a:lstStyle/>
+          <a:p>
+            <a:r>
+              <a:rPr lang="en-US" dirty="0" smtClean="0"/>
+              <a:t>Choose your workspace</a:t>
+            </a:r>
+            <a:endParaRPr lang="en-US" dirty="0"/>
+          </a:p>
+        </p:txBody>
+      </p:sp>
+      <p:sp>
+        <p:nvSpPr>
+          <p:cNvPr id="3" name="Date Placeholder 2"/>
+          <p:cNvSpPr>
+            <a:spLocks noGrp="1"/>
+          </p:cNvSpPr>
+          <p:nvPr>
+            <p:ph type="dt" sz="half" idx="10"/>
+          </p:nvPr>
+        </p:nvSpPr>
+        <p:spPr/>
+        <p:txBody>
+          <a:bodyPr/>
+          <a:lstStyle/>
+          <a:p>
+            <a:fld id="{C04B6024-2702-49B2-98BA-BAE3D8979AA9}" type="datetime2">
+              <a:rPr lang="en-US" smtClean="0"/>
+              <a:t>Friday, May 02, 2014</a:t>
+            </a:fld>
+            <a:endParaRPr lang="en-US" dirty="0"/>
+          </a:p>
+        </p:txBody>
+      </p:sp>
+      <p:sp>
+        <p:nvSpPr>
+          <p:cNvPr id="4" name="Footer Placeholder 3"/>
+          <p:cNvSpPr>
+            <a:spLocks noGrp="1"/>
+          </p:cNvSpPr>
+          <p:nvPr>
+            <p:ph type="ftr" sz="quarter" idx="11"/>
+          </p:nvPr>
+        </p:nvSpPr>
+        <p:spPr/>
+        <p:txBody>
+          <a:bodyPr/>
+          <a:lstStyle/>
+          <a:p>
+            <a:r>
+              <a:rPr lang="en-US" smtClean="0"/>
+              <a:t>Palle Cogburn</a:t>
+            </a:r>
+            <a:endParaRPr lang="en-US" dirty="0"/>
+          </a:p>
+        </p:txBody>
+      </p:sp>
+      <p:sp>
+        <p:nvSpPr>
+          <p:cNvPr id="5" name="Slide Number Placeholder 4"/>
+          <p:cNvSpPr>
+            <a:spLocks noGrp="1"/>
+          </p:cNvSpPr>
+          <p:nvPr>
+            <p:ph type="sldNum" sz="quarter" idx="12"/>
+          </p:nvPr>
+        </p:nvSpPr>
+        <p:spPr/>
+        <p:txBody>
+          <a:bodyPr/>
+          <a:lstStyle/>
+          <a:p>
+            <a:fld id="{8CBEA7D5-4322-4BC9-B527-2F0B772A1C61}" type="slidenum">
+              <a:rPr lang="en-US" smtClean="0"/>
+              <a:t>32</a:t>
+            </a:fld>
+            <a:endParaRPr lang="en-US" dirty="0"/>
+          </a:p>
+        </p:txBody>
+      </p:sp>
+      <p:pic>
+        <p:nvPicPr>
+          <p:cNvPr id="1026" name="Picture 2"/>
+          <p:cNvPicPr>
+            <a:picLocks noChangeAspect="1" noChangeArrowheads="1"/>
+          </p:cNvPicPr>
+          <p:nvPr/>
+        </p:nvPicPr>
+        <p:blipFill>
+          <a:blip r:embed="rId2">
+            <a:extLst>
+              <a:ext uri="{28A0092B-C50C-407E-A947-70E740481C1C}">
+                <a14:useLocalDpi xmlns:a14="http://schemas.microsoft.com/office/drawing/2010/main" val="0"/>
+              </a:ext>
+            </a:extLst>
+          </a:blip>
+          <a:srcRect/>
+          <a:stretch>
+            <a:fillRect/>
+          </a:stretch>
+        </p:blipFill>
+        <p:spPr bwMode="auto">
+          <a:xfrm>
+            <a:off x="1524000" y="2514600"/>
+            <a:ext cx="5991225" cy="2752725"/>
+          </a:xfrm>
+          <a:prstGeom prst="rect">
+            <a:avLst/>
+          </a:prstGeom>
+          <a:noFill/>
+          <a:ln>
+            <a:noFill/>
+          </a:ln>
+          <a:extLst>
+            <a:ext uri="{909E8E84-426E-40DD-AFC4-6F175D3DCCD1}">
+              <a14:hiddenFill xmlns:a14="http://schemas.microsoft.com/office/drawing/2010/main">
+                <a:solidFill>
+                  <a:schemeClr val="accent1"/>
+                </a:solidFill>
+              </a14:hiddenFill>
+            </a:ext>
+            <a:ext uri="{91240B29-F687-4F45-9708-019B960494DF}">
+              <a14:hiddenLine xmlns:a14="http://schemas.microsoft.com/office/drawing/2010/main" w="9525">
+                <a:solidFill>
+                  <a:schemeClr val="tx1"/>
+                </a:solidFill>
+                <a:miter lim="800000"/>
+                <a:headEnd/>
+                <a:tailEnd/>
+              </a14:hiddenLine>
+            </a:ext>
+          </a:extLst>
+        </p:spPr>
+      </p:pic>
+    </p:spTree>
+    <p:extLst>
+      <p:ext uri="{BB962C8B-B14F-4D97-AF65-F5344CB8AC3E}">
+        <p14:creationId xmlns:p14="http://schemas.microsoft.com/office/powerpoint/2010/main" val="654669115"/>
+      </p:ext>
+    </p:extLst>
+  </p:cSld>
+  <p:clrMapOvr>
+    <a:masterClrMapping/>
+  </p:clrMapOvr>
+  <p:timing>
+    <p:tnLst>
+      <p:par>
+        <p:cTn id="1" dur="indefinite" restart="never" nodeType="tmRoot"/>
+      </p:par>
+    </p:tnLst>
+  </p:timing>
+</p:sld>
+</file>
+
+<file path=ppt/slides/slide33.xml><?xml version="1.0" encoding="utf-8"?>
+<p:sld xmlns:a="http://schemas.openxmlformats.org/drawingml/2006/main" xmlns:r="http://schemas.openxmlformats.org/officeDocument/2006/relationships" xmlns:p="http://schemas.openxmlformats.org/presentationml/2006/main">
+  <p:cSld>
+    <p:spTree>
+      <p:nvGrpSpPr>
+        <p:cNvPr id="1" name=""/>
+        <p:cNvGrpSpPr/>
+        <p:nvPr/>
+      </p:nvGrpSpPr>
+      <p:grpSpPr>
+        <a:xfrm>
+          <a:off x="0" y="0"/>
+          <a:ext cx="0" cy="0"/>
+          <a:chOff x="0" y="0"/>
+          <a:chExt cx="0" cy="0"/>
+        </a:xfrm>
+      </p:grpSpPr>
+      <p:sp>
+        <p:nvSpPr>
+          <p:cNvPr id="2" name="Title 1"/>
+          <p:cNvSpPr>
+            <a:spLocks noGrp="1"/>
+          </p:cNvSpPr>
+          <p:nvPr>
+            <p:ph type="title"/>
+          </p:nvPr>
+        </p:nvSpPr>
+        <p:spPr/>
+        <p:txBody>
+          <a:bodyPr/>
+          <a:lstStyle/>
+          <a:p>
+            <a:r>
+              <a:rPr lang="en-US" dirty="0" smtClean="0"/>
+              <a:t>Import</a:t>
+            </a:r>
+            <a:endParaRPr lang="en-US" dirty="0"/>
+          </a:p>
+        </p:txBody>
+      </p:sp>
+      <p:sp>
+        <p:nvSpPr>
+          <p:cNvPr id="3" name="Date Placeholder 2"/>
+          <p:cNvSpPr>
+            <a:spLocks noGrp="1"/>
+          </p:cNvSpPr>
+          <p:nvPr>
+            <p:ph type="dt" sz="half" idx="10"/>
+          </p:nvPr>
+        </p:nvSpPr>
+        <p:spPr/>
+        <p:txBody>
+          <a:bodyPr/>
+          <a:lstStyle/>
+          <a:p>
+            <a:fld id="{C04B6024-2702-49B2-98BA-BAE3D8979AA9}" type="datetime2">
+              <a:rPr lang="en-US" smtClean="0"/>
+              <a:t>Friday, May 02, 2014</a:t>
+            </a:fld>
+            <a:endParaRPr lang="en-US" dirty="0"/>
+          </a:p>
+        </p:txBody>
+      </p:sp>
+      <p:sp>
+        <p:nvSpPr>
+          <p:cNvPr id="4" name="Footer Placeholder 3"/>
+          <p:cNvSpPr>
+            <a:spLocks noGrp="1"/>
+          </p:cNvSpPr>
+          <p:nvPr>
+            <p:ph type="ftr" sz="quarter" idx="11"/>
+          </p:nvPr>
+        </p:nvSpPr>
+        <p:spPr/>
+        <p:txBody>
+          <a:bodyPr/>
+          <a:lstStyle/>
+          <a:p>
+            <a:r>
+              <a:rPr lang="en-US" smtClean="0"/>
+              <a:t>Palle Cogburn</a:t>
+            </a:r>
+            <a:endParaRPr lang="en-US" dirty="0"/>
+          </a:p>
+        </p:txBody>
+      </p:sp>
+      <p:sp>
+        <p:nvSpPr>
+          <p:cNvPr id="5" name="Slide Number Placeholder 4"/>
+          <p:cNvSpPr>
+            <a:spLocks noGrp="1"/>
+          </p:cNvSpPr>
+          <p:nvPr>
+            <p:ph type="sldNum" sz="quarter" idx="12"/>
+          </p:nvPr>
+        </p:nvSpPr>
+        <p:spPr/>
+        <p:txBody>
+          <a:bodyPr/>
+          <a:lstStyle/>
+          <a:p>
+            <a:fld id="{8CBEA7D5-4322-4BC9-B527-2F0B772A1C61}" type="slidenum">
+              <a:rPr lang="en-US" smtClean="0"/>
+              <a:t>33</a:t>
+            </a:fld>
+            <a:endParaRPr lang="en-US" dirty="0"/>
+          </a:p>
+        </p:txBody>
+      </p:sp>
+      <p:pic>
+        <p:nvPicPr>
+          <p:cNvPr id="2050" name="Picture 2"/>
+          <p:cNvPicPr>
+            <a:picLocks noChangeAspect="1" noChangeArrowheads="1"/>
+          </p:cNvPicPr>
+          <p:nvPr/>
+        </p:nvPicPr>
+        <p:blipFill>
+          <a:blip r:embed="rId2">
+            <a:extLst>
+              <a:ext uri="{28A0092B-C50C-407E-A947-70E740481C1C}">
+                <a14:useLocalDpi xmlns:a14="http://schemas.microsoft.com/office/drawing/2010/main" val="0"/>
+              </a:ext>
+            </a:extLst>
+          </a:blip>
+          <a:srcRect/>
+          <a:stretch>
+            <a:fillRect/>
+          </a:stretch>
+        </p:blipFill>
+        <p:spPr bwMode="auto">
+          <a:xfrm>
+            <a:off x="2286000" y="1447800"/>
+            <a:ext cx="3314700" cy="4533900"/>
+          </a:xfrm>
+          <a:prstGeom prst="rect">
+            <a:avLst/>
+          </a:prstGeom>
+          <a:noFill/>
+          <a:ln>
+            <a:noFill/>
+          </a:ln>
+          <a:extLst>
+            <a:ext uri="{909E8E84-426E-40DD-AFC4-6F175D3DCCD1}">
+              <a14:hiddenFill xmlns:a14="http://schemas.microsoft.com/office/drawing/2010/main">
+                <a:solidFill>
+                  <a:schemeClr val="accent1"/>
+                </a:solidFill>
+              </a14:hiddenFill>
+            </a:ext>
+            <a:ext uri="{91240B29-F687-4F45-9708-019B960494DF}">
+              <a14:hiddenLine xmlns:a14="http://schemas.microsoft.com/office/drawing/2010/main" w="9525">
+                <a:solidFill>
+                  <a:schemeClr val="tx1"/>
+                </a:solidFill>
+                <a:miter lim="800000"/>
+                <a:headEnd/>
+                <a:tailEnd/>
+              </a14:hiddenLine>
+            </a:ext>
+          </a:extLst>
+        </p:spPr>
+      </p:pic>
+    </p:spTree>
+    <p:extLst>
+      <p:ext uri="{BB962C8B-B14F-4D97-AF65-F5344CB8AC3E}">
+        <p14:creationId xmlns:p14="http://schemas.microsoft.com/office/powerpoint/2010/main" val="800047220"/>
+      </p:ext>
+    </p:extLst>
+  </p:cSld>
+  <p:clrMapOvr>
+    <a:masterClrMapping/>
+  </p:clrMapOvr>
+  <p:timing>
+    <p:tnLst>
+      <p:par>
+        <p:cTn id="1" dur="indefinite" restart="never" nodeType="tmRoot"/>
+      </p:par>
+    </p:tnLst>
+  </p:timing>
+</p:sld>
+</file>
+
+<file path=ppt/slides/slide34.xml><?xml version="1.0" encoding="utf-8"?>
+<p:sld xmlns:a="http://schemas.openxmlformats.org/drawingml/2006/main" xmlns:r="http://schemas.openxmlformats.org/officeDocument/2006/relationships" xmlns:p="http://schemas.openxmlformats.org/presentationml/2006/main">
+  <p:cSld>
+    <p:spTree>
+      <p:nvGrpSpPr>
+        <p:cNvPr id="1" name=""/>
+        <p:cNvGrpSpPr/>
+        <p:nvPr/>
+      </p:nvGrpSpPr>
+      <p:grpSpPr>
+        <a:xfrm>
+          <a:off x="0" y="0"/>
+          <a:ext cx="0" cy="0"/>
+          <a:chOff x="0" y="0"/>
+          <a:chExt cx="0" cy="0"/>
+        </a:xfrm>
+      </p:grpSpPr>
+      <p:sp>
+        <p:nvSpPr>
+          <p:cNvPr id="2" name="Title 1"/>
+          <p:cNvSpPr>
+            <a:spLocks noGrp="1"/>
+          </p:cNvSpPr>
+          <p:nvPr>
+            <p:ph type="title"/>
+          </p:nvPr>
+        </p:nvSpPr>
+        <p:spPr/>
+        <p:txBody>
+          <a:bodyPr/>
+          <a:lstStyle/>
+          <a:p>
+            <a:r>
+              <a:rPr lang="en-US" dirty="0" smtClean="0"/>
+              <a:t>Project from </a:t>
+            </a:r>
+            <a:r>
+              <a:rPr lang="en-US" dirty="0" err="1" smtClean="0"/>
+              <a:t>Git</a:t>
+            </a:r>
+            <a:endParaRPr lang="en-US" dirty="0"/>
+          </a:p>
+        </p:txBody>
+      </p:sp>
+      <p:sp>
+        <p:nvSpPr>
+          <p:cNvPr id="3" name="Date Placeholder 2"/>
+          <p:cNvSpPr>
+            <a:spLocks noGrp="1"/>
+          </p:cNvSpPr>
+          <p:nvPr>
+            <p:ph type="dt" sz="half" idx="10"/>
+          </p:nvPr>
+        </p:nvSpPr>
+        <p:spPr/>
+        <p:txBody>
+          <a:bodyPr/>
+          <a:lstStyle/>
+          <a:p>
+            <a:fld id="{C04B6024-2702-49B2-98BA-BAE3D8979AA9}" type="datetime2">
+              <a:rPr lang="en-US" smtClean="0"/>
+              <a:t>Friday, May 02, 2014</a:t>
+            </a:fld>
+            <a:endParaRPr lang="en-US" dirty="0"/>
+          </a:p>
+        </p:txBody>
+      </p:sp>
+      <p:sp>
+        <p:nvSpPr>
+          <p:cNvPr id="4" name="Footer Placeholder 3"/>
+          <p:cNvSpPr>
+            <a:spLocks noGrp="1"/>
+          </p:cNvSpPr>
+          <p:nvPr>
+            <p:ph type="ftr" sz="quarter" idx="11"/>
+          </p:nvPr>
+        </p:nvSpPr>
+        <p:spPr/>
+        <p:txBody>
+          <a:bodyPr/>
+          <a:lstStyle/>
+          <a:p>
+            <a:r>
+              <a:rPr lang="en-US" smtClean="0"/>
+              <a:t>Palle Cogburn</a:t>
+            </a:r>
+            <a:endParaRPr lang="en-US" dirty="0"/>
+          </a:p>
+        </p:txBody>
+      </p:sp>
+      <p:sp>
+        <p:nvSpPr>
+          <p:cNvPr id="5" name="Slide Number Placeholder 4"/>
+          <p:cNvSpPr>
+            <a:spLocks noGrp="1"/>
+          </p:cNvSpPr>
+          <p:nvPr>
+            <p:ph type="sldNum" sz="quarter" idx="12"/>
+          </p:nvPr>
+        </p:nvSpPr>
+        <p:spPr/>
+        <p:txBody>
+          <a:bodyPr/>
+          <a:lstStyle/>
+          <a:p>
+            <a:fld id="{8CBEA7D5-4322-4BC9-B527-2F0B772A1C61}" type="slidenum">
+              <a:rPr lang="en-US" smtClean="0"/>
+              <a:t>34</a:t>
+            </a:fld>
+            <a:endParaRPr lang="en-US" dirty="0"/>
+          </a:p>
+        </p:txBody>
+      </p:sp>
+      <p:pic>
+        <p:nvPicPr>
+          <p:cNvPr id="3074" name="Picture 2"/>
+          <p:cNvPicPr>
+            <a:picLocks noChangeAspect="1" noChangeArrowheads="1"/>
+          </p:cNvPicPr>
+          <p:nvPr/>
+        </p:nvPicPr>
+        <p:blipFill>
+          <a:blip r:embed="rId2">
+            <a:extLst>
+              <a:ext uri="{28A0092B-C50C-407E-A947-70E740481C1C}">
+                <a14:useLocalDpi xmlns:a14="http://schemas.microsoft.com/office/drawing/2010/main" val="0"/>
+              </a:ext>
+            </a:extLst>
+          </a:blip>
+          <a:srcRect/>
+          <a:stretch>
+            <a:fillRect/>
+          </a:stretch>
+        </p:blipFill>
+        <p:spPr bwMode="auto">
+          <a:xfrm>
+            <a:off x="2152650" y="1188720"/>
+            <a:ext cx="4991100" cy="5248275"/>
+          </a:xfrm>
+          <a:prstGeom prst="rect">
+            <a:avLst/>
+          </a:prstGeom>
+          <a:noFill/>
+          <a:ln>
+            <a:noFill/>
+          </a:ln>
+          <a:extLst>
+            <a:ext uri="{909E8E84-426E-40DD-AFC4-6F175D3DCCD1}">
+              <a14:hiddenFill xmlns:a14="http://schemas.microsoft.com/office/drawing/2010/main">
+                <a:solidFill>
+                  <a:schemeClr val="accent1"/>
+                </a:solidFill>
+              </a14:hiddenFill>
+            </a:ext>
+            <a:ext uri="{91240B29-F687-4F45-9708-019B960494DF}">
+              <a14:hiddenLine xmlns:a14="http://schemas.microsoft.com/office/drawing/2010/main" w="9525">
+                <a:solidFill>
+                  <a:schemeClr val="tx1"/>
+                </a:solidFill>
+                <a:miter lim="800000"/>
+                <a:headEnd/>
+                <a:tailEnd/>
+              </a14:hiddenLine>
+            </a:ext>
+          </a:extLst>
+        </p:spPr>
+      </p:pic>
+    </p:spTree>
+    <p:extLst>
+      <p:ext uri="{BB962C8B-B14F-4D97-AF65-F5344CB8AC3E}">
+        <p14:creationId xmlns:p14="http://schemas.microsoft.com/office/powerpoint/2010/main" val="599574095"/>
+      </p:ext>
+    </p:extLst>
+  </p:cSld>
+  <p:clrMapOvr>
+    <a:masterClrMapping/>
+  </p:clrMapOvr>
+  <p:timing>
+    <p:tnLst>
+      <p:par>
+        <p:cTn id="1" dur="indefinite" restart="never" nodeType="tmRoot"/>
+      </p:par>
+    </p:tnLst>
+  </p:timing>
+</p:sld>
+</file>
+
+<file path=ppt/slides/slide35.xml><?xml version="1.0" encoding="utf-8"?>
+<p:sld xmlns:a="http://schemas.openxmlformats.org/drawingml/2006/main" xmlns:r="http://schemas.openxmlformats.org/officeDocument/2006/relationships" xmlns:p="http://schemas.openxmlformats.org/presentationml/2006/main">
+  <p:cSld>
+    <p:spTree>
+      <p:nvGrpSpPr>
+        <p:cNvPr id="1" name=""/>
+        <p:cNvGrpSpPr/>
+        <p:nvPr/>
+      </p:nvGrpSpPr>
+      <p:grpSpPr>
+        <a:xfrm>
+          <a:off x="0" y="0"/>
+          <a:ext cx="0" cy="0"/>
+          <a:chOff x="0" y="0"/>
+          <a:chExt cx="0" cy="0"/>
+        </a:xfrm>
+      </p:grpSpPr>
+      <p:sp>
+        <p:nvSpPr>
+          <p:cNvPr id="2" name="Title 1"/>
+          <p:cNvSpPr>
+            <a:spLocks noGrp="1"/>
+          </p:cNvSpPr>
+          <p:nvPr>
+            <p:ph type="title"/>
+          </p:nvPr>
+        </p:nvSpPr>
+        <p:spPr/>
+        <p:txBody>
+          <a:bodyPr/>
+          <a:lstStyle/>
+          <a:p>
+            <a:r>
+              <a:rPr lang="en-US" dirty="0" smtClean="0"/>
+              <a:t>Clone URI</a:t>
+            </a:r>
+            <a:endParaRPr lang="en-US" dirty="0"/>
+          </a:p>
+        </p:txBody>
+      </p:sp>
+      <p:sp>
+        <p:nvSpPr>
+          <p:cNvPr id="3" name="Date Placeholder 2"/>
+          <p:cNvSpPr>
+            <a:spLocks noGrp="1"/>
+          </p:cNvSpPr>
+          <p:nvPr>
+            <p:ph type="dt" sz="half" idx="10"/>
+          </p:nvPr>
+        </p:nvSpPr>
+        <p:spPr/>
+        <p:txBody>
+          <a:bodyPr/>
+          <a:lstStyle/>
+          <a:p>
+            <a:fld id="{C04B6024-2702-49B2-98BA-BAE3D8979AA9}" type="datetime2">
+              <a:rPr lang="en-US" smtClean="0"/>
+              <a:t>Friday, May 02, 2014</a:t>
+            </a:fld>
+            <a:endParaRPr lang="en-US" dirty="0"/>
+          </a:p>
+        </p:txBody>
+      </p:sp>
+      <p:sp>
+        <p:nvSpPr>
+          <p:cNvPr id="4" name="Footer Placeholder 3"/>
+          <p:cNvSpPr>
+            <a:spLocks noGrp="1"/>
+          </p:cNvSpPr>
+          <p:nvPr>
+            <p:ph type="ftr" sz="quarter" idx="11"/>
+          </p:nvPr>
+        </p:nvSpPr>
+        <p:spPr/>
+        <p:txBody>
+          <a:bodyPr/>
+          <a:lstStyle/>
+          <a:p>
+            <a:r>
+              <a:rPr lang="en-US" smtClean="0"/>
+              <a:t>Palle Cogburn</a:t>
+            </a:r>
+            <a:endParaRPr lang="en-US" dirty="0"/>
+          </a:p>
+        </p:txBody>
+      </p:sp>
+      <p:sp>
+        <p:nvSpPr>
+          <p:cNvPr id="5" name="Slide Number Placeholder 4"/>
+          <p:cNvSpPr>
+            <a:spLocks noGrp="1"/>
+          </p:cNvSpPr>
+          <p:nvPr>
+            <p:ph type="sldNum" sz="quarter" idx="12"/>
+          </p:nvPr>
+        </p:nvSpPr>
+        <p:spPr/>
+        <p:txBody>
+          <a:bodyPr/>
+          <a:lstStyle/>
+          <a:p>
+            <a:fld id="{8CBEA7D5-4322-4BC9-B527-2F0B772A1C61}" type="slidenum">
+              <a:rPr lang="en-US" smtClean="0"/>
+              <a:t>35</a:t>
+            </a:fld>
+            <a:endParaRPr lang="en-US" dirty="0"/>
+          </a:p>
+        </p:txBody>
+      </p:sp>
+      <p:pic>
+        <p:nvPicPr>
+          <p:cNvPr id="4098" name="Picture 2"/>
+          <p:cNvPicPr>
+            <a:picLocks noChangeAspect="1" noChangeArrowheads="1"/>
+          </p:cNvPicPr>
+          <p:nvPr/>
+        </p:nvPicPr>
+        <p:blipFill>
+          <a:blip r:embed="rId2">
+            <a:extLst>
+              <a:ext uri="{28A0092B-C50C-407E-A947-70E740481C1C}">
+                <a14:useLocalDpi xmlns:a14="http://schemas.microsoft.com/office/drawing/2010/main" val="0"/>
+              </a:ext>
+            </a:extLst>
+          </a:blip>
+          <a:srcRect/>
+          <a:stretch>
+            <a:fillRect/>
+          </a:stretch>
+        </p:blipFill>
+        <p:spPr bwMode="auto">
+          <a:xfrm>
+            <a:off x="2209800" y="1143000"/>
+            <a:ext cx="5000625" cy="5238750"/>
+          </a:xfrm>
+          <a:prstGeom prst="rect">
+            <a:avLst/>
+          </a:prstGeom>
+          <a:noFill/>
+          <a:ln>
+            <a:noFill/>
+          </a:ln>
+          <a:extLst>
+            <a:ext uri="{909E8E84-426E-40DD-AFC4-6F175D3DCCD1}">
+              <a14:hiddenFill xmlns:a14="http://schemas.microsoft.com/office/drawing/2010/main">
+                <a:solidFill>
+                  <a:schemeClr val="accent1"/>
+                </a:solidFill>
+              </a14:hiddenFill>
+            </a:ext>
+            <a:ext uri="{91240B29-F687-4F45-9708-019B960494DF}">
+              <a14:hiddenLine xmlns:a14="http://schemas.microsoft.com/office/drawing/2010/main" w="9525">
+                <a:solidFill>
+                  <a:schemeClr val="tx1"/>
+                </a:solidFill>
+                <a:miter lim="800000"/>
+                <a:headEnd/>
+                <a:tailEnd/>
+              </a14:hiddenLine>
+            </a:ext>
+          </a:extLst>
+        </p:spPr>
+      </p:pic>
+    </p:spTree>
+    <p:extLst>
+      <p:ext uri="{BB962C8B-B14F-4D97-AF65-F5344CB8AC3E}">
+        <p14:creationId xmlns:p14="http://schemas.microsoft.com/office/powerpoint/2010/main" val="3686164532"/>
+      </p:ext>
+    </p:extLst>
+  </p:cSld>
+  <p:clrMapOvr>
+    <a:masterClrMapping/>
+  </p:clrMapOvr>
+  <p:timing>
+    <p:tnLst>
+      <p:par>
+        <p:cTn id="1" dur="indefinite" restart="never" nodeType="tmRoot"/>
+      </p:par>
+    </p:tnLst>
+  </p:timing>
+</p:sld>
+</file>
+
+<file path=ppt/slides/slide36.xml><?xml version="1.0" encoding="utf-8"?>
+<p:sld xmlns:a="http://schemas.openxmlformats.org/drawingml/2006/main" xmlns:r="http://schemas.openxmlformats.org/officeDocument/2006/relationships" xmlns:p="http://schemas.openxmlformats.org/presentationml/2006/main">
+  <p:cSld>
+    <p:spTree>
+      <p:nvGrpSpPr>
+        <p:cNvPr id="1" name=""/>
+        <p:cNvGrpSpPr/>
+        <p:nvPr/>
+      </p:nvGrpSpPr>
+      <p:grpSpPr>
+        <a:xfrm>
+          <a:off x="0" y="0"/>
+          <a:ext cx="0" cy="0"/>
+          <a:chOff x="0" y="0"/>
+          <a:chExt cx="0" cy="0"/>
+        </a:xfrm>
+      </p:grpSpPr>
+      <p:sp>
+        <p:nvSpPr>
+          <p:cNvPr id="2" name="Title 1"/>
+          <p:cNvSpPr>
+            <a:spLocks noGrp="1"/>
+          </p:cNvSpPr>
+          <p:nvPr>
+            <p:ph type="title"/>
+          </p:nvPr>
+        </p:nvSpPr>
+        <p:spPr/>
+        <p:txBody>
+          <a:bodyPr/>
+          <a:lstStyle/>
+          <a:p>
+            <a:r>
+              <a:rPr lang="en-US" dirty="0" smtClean="0"/>
+              <a:t>Clone URI</a:t>
+            </a:r>
+            <a:endParaRPr lang="en-US" dirty="0"/>
+          </a:p>
+        </p:txBody>
+      </p:sp>
+      <p:sp>
+        <p:nvSpPr>
+          <p:cNvPr id="3" name="Date Placeholder 2"/>
+          <p:cNvSpPr>
+            <a:spLocks noGrp="1"/>
+          </p:cNvSpPr>
+          <p:nvPr>
+            <p:ph type="dt" sz="half" idx="10"/>
+          </p:nvPr>
+        </p:nvSpPr>
+        <p:spPr/>
+        <p:txBody>
+          <a:bodyPr/>
+          <a:lstStyle/>
+          <a:p>
+            <a:fld id="{C04B6024-2702-49B2-98BA-BAE3D8979AA9}" type="datetime2">
+              <a:rPr lang="en-US" smtClean="0"/>
+              <a:t>Friday, May 02, 2014</a:t>
+            </a:fld>
+            <a:endParaRPr lang="en-US" dirty="0"/>
+          </a:p>
+        </p:txBody>
+      </p:sp>
+      <p:sp>
+        <p:nvSpPr>
+          <p:cNvPr id="4" name="Footer Placeholder 3"/>
+          <p:cNvSpPr>
+            <a:spLocks noGrp="1"/>
+          </p:cNvSpPr>
+          <p:nvPr>
+            <p:ph type="ftr" sz="quarter" idx="11"/>
+          </p:nvPr>
+        </p:nvSpPr>
+        <p:spPr/>
+        <p:txBody>
+          <a:bodyPr/>
+          <a:lstStyle/>
+          <a:p>
+            <a:r>
+              <a:rPr lang="en-US" smtClean="0"/>
+              <a:t>Palle Cogburn</a:t>
+            </a:r>
+            <a:endParaRPr lang="en-US" dirty="0"/>
+          </a:p>
+        </p:txBody>
+      </p:sp>
+      <p:sp>
+        <p:nvSpPr>
+          <p:cNvPr id="5" name="Slide Number Placeholder 4"/>
+          <p:cNvSpPr>
+            <a:spLocks noGrp="1"/>
+          </p:cNvSpPr>
+          <p:nvPr>
+            <p:ph type="sldNum" sz="quarter" idx="12"/>
+          </p:nvPr>
+        </p:nvSpPr>
+        <p:spPr/>
+        <p:txBody>
+          <a:bodyPr/>
+          <a:lstStyle/>
+          <a:p>
+            <a:fld id="{8CBEA7D5-4322-4BC9-B527-2F0B772A1C61}" type="slidenum">
+              <a:rPr lang="en-US" smtClean="0"/>
+              <a:t>36</a:t>
+            </a:fld>
+            <a:endParaRPr lang="en-US" dirty="0"/>
+          </a:p>
+        </p:txBody>
+      </p:sp>
+      <p:pic>
+        <p:nvPicPr>
+          <p:cNvPr id="5122" name="Picture 2"/>
+          <p:cNvPicPr>
+            <a:picLocks noChangeAspect="1" noChangeArrowheads="1"/>
+          </p:cNvPicPr>
+          <p:nvPr/>
+        </p:nvPicPr>
+        <p:blipFill>
+          <a:blip r:embed="rId2">
+            <a:extLst>
+              <a:ext uri="{28A0092B-C50C-407E-A947-70E740481C1C}">
+                <a14:useLocalDpi xmlns:a14="http://schemas.microsoft.com/office/drawing/2010/main" val="0"/>
+              </a:ext>
+            </a:extLst>
+          </a:blip>
+          <a:srcRect/>
+          <a:stretch>
+            <a:fillRect/>
+          </a:stretch>
+        </p:blipFill>
+        <p:spPr bwMode="auto">
+          <a:xfrm>
+            <a:off x="2743200" y="3543300"/>
+            <a:ext cx="4300538" cy="1685925"/>
+          </a:xfrm>
+          <a:prstGeom prst="rect">
+            <a:avLst/>
+          </a:prstGeom>
+          <a:noFill/>
+          <a:ln>
+            <a:noFill/>
+          </a:ln>
+          <a:extLst>
+            <a:ext uri="{909E8E84-426E-40DD-AFC4-6F175D3DCCD1}">
+              <a14:hiddenFill xmlns:a14="http://schemas.microsoft.com/office/drawing/2010/main">
+                <a:solidFill>
+                  <a:schemeClr val="accent1"/>
+                </a:solidFill>
+              </a14:hiddenFill>
+            </a:ext>
+            <a:ext uri="{91240B29-F687-4F45-9708-019B960494DF}">
+              <a14:hiddenLine xmlns:a14="http://schemas.microsoft.com/office/drawing/2010/main" w="9525">
+                <a:solidFill>
+                  <a:schemeClr val="tx1"/>
+                </a:solidFill>
+                <a:miter lim="800000"/>
+                <a:headEnd/>
+                <a:tailEnd/>
+              </a14:hiddenLine>
+            </a:ext>
+          </a:extLst>
+        </p:spPr>
+      </p:pic>
+      <p:pic>
+        <p:nvPicPr>
+          <p:cNvPr id="5123" name="Picture 3"/>
+          <p:cNvPicPr>
+            <a:picLocks noChangeAspect="1" noChangeArrowheads="1"/>
+          </p:cNvPicPr>
+          <p:nvPr/>
+        </p:nvPicPr>
+        <p:blipFill>
+          <a:blip r:embed="rId3">
+            <a:extLst>
+              <a:ext uri="{28A0092B-C50C-407E-A947-70E740481C1C}">
+                <a14:useLocalDpi xmlns:a14="http://schemas.microsoft.com/office/drawing/2010/main" val="0"/>
+              </a:ext>
+            </a:extLst>
+          </a:blip>
+          <a:srcRect/>
+          <a:stretch>
+            <a:fillRect/>
+          </a:stretch>
+        </p:blipFill>
+        <p:spPr bwMode="auto">
+          <a:xfrm>
+            <a:off x="533400" y="1524000"/>
+            <a:ext cx="5943600" cy="2019300"/>
+          </a:xfrm>
+          <a:prstGeom prst="rect">
+            <a:avLst/>
+          </a:prstGeom>
+          <a:noFill/>
+          <a:ln>
+            <a:noFill/>
+          </a:ln>
+          <a:extLst>
+            <a:ext uri="{909E8E84-426E-40DD-AFC4-6F175D3DCCD1}">
+              <a14:hiddenFill xmlns:a14="http://schemas.microsoft.com/office/drawing/2010/main">
+                <a:solidFill>
+                  <a:schemeClr val="accent1"/>
+                </a:solidFill>
+              </a14:hiddenFill>
+            </a:ext>
+            <a:ext uri="{91240B29-F687-4F45-9708-019B960494DF}">
+              <a14:hiddenLine xmlns:a14="http://schemas.microsoft.com/office/drawing/2010/main" w="9525">
+                <a:solidFill>
+                  <a:schemeClr val="tx1"/>
+                </a:solidFill>
+                <a:miter lim="800000"/>
+                <a:headEnd/>
+                <a:tailEnd/>
+              </a14:hiddenLine>
+            </a:ext>
+          </a:extLst>
+        </p:spPr>
+      </p:pic>
+      <p:sp>
+        <p:nvSpPr>
+          <p:cNvPr id="7" name="TextBox 6"/>
+          <p:cNvSpPr txBox="1"/>
+          <p:nvPr/>
+        </p:nvSpPr>
+        <p:spPr>
+          <a:xfrm>
+            <a:off x="4114800" y="5454134"/>
+            <a:ext cx="4166910" cy="369332"/>
+          </a:xfrm>
+          <a:prstGeom prst="rect">
+            <a:avLst/>
+          </a:prstGeom>
+          <a:noFill/>
+        </p:spPr>
+        <p:txBody>
+          <a:bodyPr wrap="none" rtlCol="0">
+            <a:spAutoFit/>
+          </a:bodyPr>
+          <a:lstStyle/>
+          <a:p>
+            <a:r>
+              <a:rPr lang="en-US" dirty="0"/>
+              <a:t>https://github.com/mscsbend/sandbox.git</a:t>
+            </a:r>
+          </a:p>
+        </p:txBody>
+      </p:sp>
+    </p:spTree>
+    <p:extLst>
+      <p:ext uri="{BB962C8B-B14F-4D97-AF65-F5344CB8AC3E}">
+        <p14:creationId xmlns:p14="http://schemas.microsoft.com/office/powerpoint/2010/main" val="393073761"/>
+      </p:ext>
+    </p:extLst>
+  </p:cSld>
+  <p:clrMapOvr>
+    <a:masterClrMapping/>
+  </p:clrMapOvr>
+  <p:timing>
+    <p:tnLst>
+      <p:par>
+        <p:cTn id="1" dur="indefinite" restart="never" nodeType="tmRoot"/>
+      </p:par>
+    </p:tnLst>
+  </p:timing>
+</p:sld>
+</file>
+
+<file path=ppt/slides/slide37.xml><?xml version="1.0" encoding="utf-8"?>
+<p:sld xmlns:a="http://schemas.openxmlformats.org/drawingml/2006/main" xmlns:r="http://schemas.openxmlformats.org/officeDocument/2006/relationships" xmlns:p="http://schemas.openxmlformats.org/presentationml/2006/main">
+  <p:cSld>
+    <p:spTree>
+      <p:nvGrpSpPr>
+        <p:cNvPr id="1" name=""/>
+        <p:cNvGrpSpPr/>
+        <p:nvPr/>
+      </p:nvGrpSpPr>
+      <p:grpSpPr>
+        <a:xfrm>
+          <a:off x="0" y="0"/>
+          <a:ext cx="0" cy="0"/>
+          <a:chOff x="0" y="0"/>
+          <a:chExt cx="0" cy="0"/>
+        </a:xfrm>
+      </p:grpSpPr>
+      <p:sp>
+        <p:nvSpPr>
+          <p:cNvPr id="2" name="Title 1"/>
+          <p:cNvSpPr>
+            <a:spLocks noGrp="1"/>
+          </p:cNvSpPr>
+          <p:nvPr>
+            <p:ph type="title"/>
+          </p:nvPr>
+        </p:nvSpPr>
+        <p:spPr/>
+        <p:txBody>
+          <a:bodyPr/>
+          <a:lstStyle/>
+          <a:p>
+            <a:r>
+              <a:rPr lang="en-US" dirty="0" smtClean="0"/>
+              <a:t>Clone URI</a:t>
+            </a:r>
+            <a:endParaRPr lang="en-US" dirty="0"/>
+          </a:p>
+        </p:txBody>
+      </p:sp>
+      <p:sp>
+        <p:nvSpPr>
+          <p:cNvPr id="3" name="Date Placeholder 2"/>
+          <p:cNvSpPr>
+            <a:spLocks noGrp="1"/>
+          </p:cNvSpPr>
+          <p:nvPr>
+            <p:ph type="dt" sz="half" idx="10"/>
+          </p:nvPr>
+        </p:nvSpPr>
+        <p:spPr/>
+        <p:txBody>
+          <a:bodyPr/>
+          <a:lstStyle/>
+          <a:p>
+            <a:fld id="{C04B6024-2702-49B2-98BA-BAE3D8979AA9}" type="datetime2">
+              <a:rPr lang="en-US" smtClean="0"/>
+              <a:t>Friday, May 02, 2014</a:t>
+            </a:fld>
+            <a:endParaRPr lang="en-US" dirty="0"/>
+          </a:p>
+        </p:txBody>
+      </p:sp>
+      <p:sp>
+        <p:nvSpPr>
+          <p:cNvPr id="4" name="Footer Placeholder 3"/>
+          <p:cNvSpPr>
+            <a:spLocks noGrp="1"/>
+          </p:cNvSpPr>
+          <p:nvPr>
+            <p:ph type="ftr" sz="quarter" idx="11"/>
+          </p:nvPr>
+        </p:nvSpPr>
+        <p:spPr/>
+        <p:txBody>
+          <a:bodyPr/>
+          <a:lstStyle/>
+          <a:p>
+            <a:r>
+              <a:rPr lang="en-US" smtClean="0"/>
+              <a:t>Palle Cogburn</a:t>
+            </a:r>
+            <a:endParaRPr lang="en-US" dirty="0"/>
+          </a:p>
+        </p:txBody>
+      </p:sp>
+      <p:sp>
+        <p:nvSpPr>
+          <p:cNvPr id="5" name="Slide Number Placeholder 4"/>
+          <p:cNvSpPr>
+            <a:spLocks noGrp="1"/>
+          </p:cNvSpPr>
+          <p:nvPr>
+            <p:ph type="sldNum" sz="quarter" idx="12"/>
+          </p:nvPr>
+        </p:nvSpPr>
+        <p:spPr/>
+        <p:txBody>
+          <a:bodyPr/>
+          <a:lstStyle/>
+          <a:p>
+            <a:fld id="{8CBEA7D5-4322-4BC9-B527-2F0B772A1C61}" type="slidenum">
+              <a:rPr lang="en-US" smtClean="0"/>
+              <a:t>37</a:t>
+            </a:fld>
+            <a:endParaRPr lang="en-US" dirty="0"/>
+          </a:p>
+        </p:txBody>
+      </p:sp>
+      <p:pic>
+        <p:nvPicPr>
+          <p:cNvPr id="6146" name="Picture 2"/>
+          <p:cNvPicPr>
+            <a:picLocks noChangeAspect="1" noChangeArrowheads="1"/>
+          </p:cNvPicPr>
+          <p:nvPr/>
+        </p:nvPicPr>
+        <p:blipFill>
+          <a:blip r:embed="rId2">
+            <a:extLst>
+              <a:ext uri="{28A0092B-C50C-407E-A947-70E740481C1C}">
+                <a14:useLocalDpi xmlns:a14="http://schemas.microsoft.com/office/drawing/2010/main" val="0"/>
+              </a:ext>
+            </a:extLst>
+          </a:blip>
+          <a:srcRect/>
+          <a:stretch>
+            <a:fillRect/>
+          </a:stretch>
+        </p:blipFill>
+        <p:spPr bwMode="auto">
+          <a:xfrm>
+            <a:off x="2286000" y="1143000"/>
+            <a:ext cx="5010150" cy="5238750"/>
+          </a:xfrm>
+          <a:prstGeom prst="rect">
+            <a:avLst/>
+          </a:prstGeom>
+          <a:noFill/>
+          <a:ln>
+            <a:noFill/>
+          </a:ln>
+          <a:extLst>
+            <a:ext uri="{909E8E84-426E-40DD-AFC4-6F175D3DCCD1}">
+              <a14:hiddenFill xmlns:a14="http://schemas.microsoft.com/office/drawing/2010/main">
+                <a:solidFill>
+                  <a:schemeClr val="accent1"/>
+                </a:solidFill>
+              </a14:hiddenFill>
+            </a:ext>
+            <a:ext uri="{91240B29-F687-4F45-9708-019B960494DF}">
+              <a14:hiddenLine xmlns:a14="http://schemas.microsoft.com/office/drawing/2010/main" w="9525">
+                <a:solidFill>
+                  <a:schemeClr val="tx1"/>
+                </a:solidFill>
+                <a:miter lim="800000"/>
+                <a:headEnd/>
+                <a:tailEnd/>
+              </a14:hiddenLine>
+            </a:ext>
+          </a:extLst>
+        </p:spPr>
+      </p:pic>
+      <p:sp>
+        <p:nvSpPr>
+          <p:cNvPr id="6" name="Right Arrow 5"/>
+          <p:cNvSpPr/>
+          <p:nvPr/>
+        </p:nvSpPr>
+        <p:spPr>
+          <a:xfrm>
+            <a:off x="1676400" y="2362200"/>
+            <a:ext cx="457200" cy="381000"/>
+          </a:xfrm>
+          <a:prstGeom prst="rightArrow">
+            <a:avLst/>
+          </a:prstGeom>
+          <a:noFill/>
+          <a:ln>
+            <a:solidFill>
+              <a:srgbClr val="FF0000"/>
+            </a:solidFill>
+          </a:ln>
+        </p:spPr>
+        <p:style>
+          <a:lnRef idx="2">
+            <a:schemeClr val="accent1">
+              <a:shade val="50000"/>
+            </a:schemeClr>
+          </a:lnRef>
+          <a:fillRef idx="1">
+            <a:schemeClr val="accent1"/>
+          </a:fillRef>
+          <a:effectRef idx="0">
+            <a:schemeClr val="accent1"/>
+          </a:effectRef>
+          <a:fontRef idx="minor">
+            <a:schemeClr val="lt1"/>
+          </a:fontRef>
+        </p:style>
+        <p:txBody>
+          <a:bodyPr rtlCol="0" anchor="ctr"/>
+          <a:lstStyle/>
+          <a:p>
+            <a:pPr algn="ctr"/>
+            <a:endParaRPr lang="en-US"/>
+          </a:p>
+        </p:txBody>
+      </p:sp>
+      <p:sp>
+        <p:nvSpPr>
+          <p:cNvPr id="7" name="TextBox 6"/>
+          <p:cNvSpPr txBox="1"/>
+          <p:nvPr/>
+        </p:nvSpPr>
+        <p:spPr>
+          <a:xfrm>
+            <a:off x="1493742" y="1992868"/>
+            <a:ext cx="686022" cy="369332"/>
+          </a:xfrm>
+          <a:prstGeom prst="rect">
+            <a:avLst/>
+          </a:prstGeom>
+          <a:noFill/>
+        </p:spPr>
+        <p:txBody>
+          <a:bodyPr wrap="none" rtlCol="0">
+            <a:spAutoFit/>
+          </a:bodyPr>
+          <a:lstStyle/>
+          <a:p>
+            <a:r>
+              <a:rPr lang="en-US" dirty="0" smtClean="0"/>
+              <a:t>Paste</a:t>
+            </a:r>
+            <a:endParaRPr lang="en-US" dirty="0"/>
+          </a:p>
+        </p:txBody>
+      </p:sp>
+    </p:spTree>
+    <p:extLst>
+      <p:ext uri="{BB962C8B-B14F-4D97-AF65-F5344CB8AC3E}">
+        <p14:creationId xmlns:p14="http://schemas.microsoft.com/office/powerpoint/2010/main" val="1376365498"/>
+      </p:ext>
+    </p:extLst>
+  </p:cSld>
+  <p:clrMapOvr>
+    <a:masterClrMapping/>
+  </p:clrMapOvr>
+  <p:timing>
+    <p:tnLst>
+      <p:par>
+        <p:cTn id="1" dur="indefinite" restart="never" nodeType="tmRoot"/>
+      </p:par>
+    </p:tnLst>
+  </p:timing>
+</p:sld>
+</file>
+
+<file path=ppt/slides/slide38.xml><?xml version="1.0" encoding="utf-8"?>
+<p:sld xmlns:a="http://schemas.openxmlformats.org/drawingml/2006/main" xmlns:r="http://schemas.openxmlformats.org/officeDocument/2006/relationships" xmlns:p="http://schemas.openxmlformats.org/presentationml/2006/main">
+  <p:cSld>
+    <p:spTree>
+      <p:nvGrpSpPr>
+        <p:cNvPr id="1" name=""/>
+        <p:cNvGrpSpPr/>
+        <p:nvPr/>
+      </p:nvGrpSpPr>
+      <p:grpSpPr>
+        <a:xfrm>
+          <a:off x="0" y="0"/>
+          <a:ext cx="0" cy="0"/>
+          <a:chOff x="0" y="0"/>
+          <a:chExt cx="0" cy="0"/>
+        </a:xfrm>
+      </p:grpSpPr>
+      <p:sp>
+        <p:nvSpPr>
+          <p:cNvPr id="2" name="Title 1"/>
+          <p:cNvSpPr>
+            <a:spLocks noGrp="1"/>
+          </p:cNvSpPr>
+          <p:nvPr>
+            <p:ph type="title"/>
+          </p:nvPr>
+        </p:nvSpPr>
+        <p:spPr/>
+        <p:txBody>
+          <a:bodyPr/>
+          <a:lstStyle/>
+          <a:p>
+            <a:r>
+              <a:rPr lang="en-US" dirty="0" smtClean="0"/>
+              <a:t>Branch</a:t>
+            </a:r>
+            <a:endParaRPr lang="en-US" dirty="0"/>
+          </a:p>
+        </p:txBody>
+      </p:sp>
+      <p:sp>
+        <p:nvSpPr>
+          <p:cNvPr id="3" name="Date Placeholder 2"/>
+          <p:cNvSpPr>
+            <a:spLocks noGrp="1"/>
+          </p:cNvSpPr>
+          <p:nvPr>
+            <p:ph type="dt" sz="half" idx="10"/>
+          </p:nvPr>
+        </p:nvSpPr>
+        <p:spPr/>
+        <p:txBody>
+          <a:bodyPr/>
+          <a:lstStyle/>
+          <a:p>
+            <a:fld id="{C04B6024-2702-49B2-98BA-BAE3D8979AA9}" type="datetime2">
+              <a:rPr lang="en-US" smtClean="0"/>
+              <a:t>Friday, May 02, 2014</a:t>
+            </a:fld>
+            <a:endParaRPr lang="en-US" dirty="0"/>
+          </a:p>
+        </p:txBody>
+      </p:sp>
+      <p:sp>
+        <p:nvSpPr>
+          <p:cNvPr id="4" name="Footer Placeholder 3"/>
+          <p:cNvSpPr>
+            <a:spLocks noGrp="1"/>
+          </p:cNvSpPr>
+          <p:nvPr>
+            <p:ph type="ftr" sz="quarter" idx="11"/>
+          </p:nvPr>
+        </p:nvSpPr>
+        <p:spPr/>
+        <p:txBody>
+          <a:bodyPr/>
+          <a:lstStyle/>
+          <a:p>
+            <a:r>
+              <a:rPr lang="en-US" smtClean="0"/>
+              <a:t>Palle Cogburn</a:t>
+            </a:r>
+            <a:endParaRPr lang="en-US" dirty="0"/>
+          </a:p>
+        </p:txBody>
+      </p:sp>
+      <p:sp>
+        <p:nvSpPr>
+          <p:cNvPr id="5" name="Slide Number Placeholder 4"/>
+          <p:cNvSpPr>
+            <a:spLocks noGrp="1"/>
+          </p:cNvSpPr>
+          <p:nvPr>
+            <p:ph type="sldNum" sz="quarter" idx="12"/>
+          </p:nvPr>
+        </p:nvSpPr>
+        <p:spPr/>
+        <p:txBody>
+          <a:bodyPr/>
+          <a:lstStyle/>
+          <a:p>
+            <a:fld id="{8CBEA7D5-4322-4BC9-B527-2F0B772A1C61}" type="slidenum">
+              <a:rPr lang="en-US" smtClean="0"/>
+              <a:t>38</a:t>
+            </a:fld>
+            <a:endParaRPr lang="en-US" dirty="0"/>
+          </a:p>
+        </p:txBody>
+      </p:sp>
+      <p:pic>
+        <p:nvPicPr>
+          <p:cNvPr id="7170" name="Picture 2"/>
+          <p:cNvPicPr>
+            <a:picLocks noChangeAspect="1" noChangeArrowheads="1"/>
+          </p:cNvPicPr>
+          <p:nvPr/>
+        </p:nvPicPr>
+        <p:blipFill>
+          <a:blip r:embed="rId2">
+            <a:extLst>
+              <a:ext uri="{28A0092B-C50C-407E-A947-70E740481C1C}">
+                <a14:useLocalDpi xmlns:a14="http://schemas.microsoft.com/office/drawing/2010/main" val="0"/>
+              </a:ext>
+            </a:extLst>
+          </a:blip>
+          <a:srcRect/>
+          <a:stretch>
+            <a:fillRect/>
+          </a:stretch>
+        </p:blipFill>
+        <p:spPr bwMode="auto">
+          <a:xfrm>
+            <a:off x="2286000" y="1143000"/>
+            <a:ext cx="4991100" cy="5229225"/>
+          </a:xfrm>
+          <a:prstGeom prst="rect">
+            <a:avLst/>
+          </a:prstGeom>
+          <a:noFill/>
+          <a:ln>
+            <a:noFill/>
+          </a:ln>
+          <a:extLst>
+            <a:ext uri="{909E8E84-426E-40DD-AFC4-6F175D3DCCD1}">
+              <a14:hiddenFill xmlns:a14="http://schemas.microsoft.com/office/drawing/2010/main">
+                <a:solidFill>
+                  <a:schemeClr val="accent1"/>
+                </a:solidFill>
+              </a14:hiddenFill>
+            </a:ext>
+            <a:ext uri="{91240B29-F687-4F45-9708-019B960494DF}">
+              <a14:hiddenLine xmlns:a14="http://schemas.microsoft.com/office/drawing/2010/main" w="9525">
+                <a:solidFill>
+                  <a:schemeClr val="tx1"/>
+                </a:solidFill>
+                <a:miter lim="800000"/>
+                <a:headEnd/>
+                <a:tailEnd/>
+              </a14:hiddenLine>
+            </a:ext>
+          </a:extLst>
+        </p:spPr>
+      </p:pic>
+    </p:spTree>
+    <p:extLst>
+      <p:ext uri="{BB962C8B-B14F-4D97-AF65-F5344CB8AC3E}">
+        <p14:creationId xmlns:p14="http://schemas.microsoft.com/office/powerpoint/2010/main" val="889295144"/>
+      </p:ext>
+    </p:extLst>
+  </p:cSld>
+  <p:clrMapOvr>
+    <a:masterClrMapping/>
+  </p:clrMapOvr>
+  <p:timing>
+    <p:tnLst>
+      <p:par>
+        <p:cTn id="1" dur="indefinite" restart="never" nodeType="tmRoot"/>
+      </p:par>
+    </p:tnLst>
+  </p:timing>
+</p:sld>
+</file>
+
+<file path=ppt/slides/slide39.xml><?xml version="1.0" encoding="utf-8"?>
+<p:sld xmlns:a="http://schemas.openxmlformats.org/drawingml/2006/main" xmlns:r="http://schemas.openxmlformats.org/officeDocument/2006/relationships" xmlns:p="http://schemas.openxmlformats.org/presentationml/2006/main">
+  <p:cSld>
+    <p:spTree>
+      <p:nvGrpSpPr>
+        <p:cNvPr id="1" name=""/>
+        <p:cNvGrpSpPr/>
+        <p:nvPr/>
+      </p:nvGrpSpPr>
+      <p:grpSpPr>
+        <a:xfrm>
+          <a:off x="0" y="0"/>
+          <a:ext cx="0" cy="0"/>
+          <a:chOff x="0" y="0"/>
+          <a:chExt cx="0" cy="0"/>
+        </a:xfrm>
+      </p:grpSpPr>
+      <p:sp>
+        <p:nvSpPr>
+          <p:cNvPr id="2" name="Title 1"/>
+          <p:cNvSpPr>
+            <a:spLocks noGrp="1"/>
+          </p:cNvSpPr>
+          <p:nvPr>
+            <p:ph type="title"/>
+          </p:nvPr>
+        </p:nvSpPr>
+        <p:spPr/>
+        <p:txBody>
+          <a:bodyPr/>
+          <a:lstStyle/>
+          <a:p>
+            <a:r>
+              <a:rPr lang="en-US" dirty="0" smtClean="0"/>
+              <a:t>Local Destination</a:t>
+            </a:r>
+            <a:endParaRPr lang="en-US" dirty="0"/>
+          </a:p>
+        </p:txBody>
+      </p:sp>
+      <p:sp>
+        <p:nvSpPr>
+          <p:cNvPr id="3" name="Date Placeholder 2"/>
+          <p:cNvSpPr>
+            <a:spLocks noGrp="1"/>
+          </p:cNvSpPr>
+          <p:nvPr>
+            <p:ph type="dt" sz="half" idx="10"/>
+          </p:nvPr>
+        </p:nvSpPr>
+        <p:spPr/>
+        <p:txBody>
+          <a:bodyPr/>
+          <a:lstStyle/>
+          <a:p>
+            <a:fld id="{C04B6024-2702-49B2-98BA-BAE3D8979AA9}" type="datetime2">
+              <a:rPr lang="en-US" smtClean="0"/>
+              <a:t>Friday, May 02, 2014</a:t>
+            </a:fld>
+            <a:endParaRPr lang="en-US" dirty="0"/>
+          </a:p>
+        </p:txBody>
+      </p:sp>
+      <p:sp>
+        <p:nvSpPr>
+          <p:cNvPr id="4" name="Footer Placeholder 3"/>
+          <p:cNvSpPr>
+            <a:spLocks noGrp="1"/>
+          </p:cNvSpPr>
+          <p:nvPr>
+            <p:ph type="ftr" sz="quarter" idx="11"/>
+          </p:nvPr>
+        </p:nvSpPr>
+        <p:spPr/>
+        <p:txBody>
+          <a:bodyPr/>
+          <a:lstStyle/>
+          <a:p>
+            <a:r>
+              <a:rPr lang="en-US" smtClean="0"/>
+              <a:t>Palle Cogburn</a:t>
+            </a:r>
+            <a:endParaRPr lang="en-US" dirty="0"/>
+          </a:p>
+        </p:txBody>
+      </p:sp>
+      <p:sp>
+        <p:nvSpPr>
+          <p:cNvPr id="5" name="Slide Number Placeholder 4"/>
+          <p:cNvSpPr>
+            <a:spLocks noGrp="1"/>
+          </p:cNvSpPr>
+          <p:nvPr>
+            <p:ph type="sldNum" sz="quarter" idx="12"/>
+          </p:nvPr>
+        </p:nvSpPr>
+        <p:spPr/>
+        <p:txBody>
+          <a:bodyPr/>
+          <a:lstStyle/>
+          <a:p>
+            <a:fld id="{8CBEA7D5-4322-4BC9-B527-2F0B772A1C61}" type="slidenum">
+              <a:rPr lang="en-US" smtClean="0"/>
+              <a:t>39</a:t>
+            </a:fld>
+            <a:endParaRPr lang="en-US" dirty="0"/>
+          </a:p>
+        </p:txBody>
+      </p:sp>
+      <p:pic>
+        <p:nvPicPr>
+          <p:cNvPr id="1026" name="Picture 2"/>
+          <p:cNvPicPr>
+            <a:picLocks noChangeAspect="1" noChangeArrowheads="1"/>
+          </p:cNvPicPr>
+          <p:nvPr/>
+        </p:nvPicPr>
+        <p:blipFill>
+          <a:blip r:embed="rId2">
+            <a:extLst>
+              <a:ext uri="{28A0092B-C50C-407E-A947-70E740481C1C}">
+                <a14:useLocalDpi xmlns:a14="http://schemas.microsoft.com/office/drawing/2010/main" val="0"/>
+              </a:ext>
+            </a:extLst>
+          </a:blip>
+          <a:srcRect/>
+          <a:stretch>
+            <a:fillRect/>
+          </a:stretch>
+        </p:blipFill>
+        <p:spPr bwMode="auto">
+          <a:xfrm>
+            <a:off x="2081213" y="1143000"/>
+            <a:ext cx="4981575" cy="5219700"/>
+          </a:xfrm>
+          <a:prstGeom prst="rect">
+            <a:avLst/>
+          </a:prstGeom>
+          <a:noFill/>
+          <a:ln>
+            <a:noFill/>
+          </a:ln>
+          <a:extLst>
+            <a:ext uri="{909E8E84-426E-40DD-AFC4-6F175D3DCCD1}">
+              <a14:hiddenFill xmlns:a14="http://schemas.microsoft.com/office/drawing/2010/main">
+                <a:solidFill>
+                  <a:schemeClr val="accent1"/>
+                </a:solidFill>
+              </a14:hiddenFill>
+            </a:ext>
+            <a:ext uri="{91240B29-F687-4F45-9708-019B960494DF}">
+              <a14:hiddenLine xmlns:a14="http://schemas.microsoft.com/office/drawing/2010/main" w="9525">
+                <a:solidFill>
+                  <a:schemeClr val="tx1"/>
+                </a:solidFill>
+                <a:miter lim="800000"/>
+                <a:headEnd/>
+                <a:tailEnd/>
+              </a14:hiddenLine>
+            </a:ext>
+          </a:extLst>
+        </p:spPr>
+      </p:pic>
+    </p:spTree>
+    <p:extLst>
+      <p:ext uri="{BB962C8B-B14F-4D97-AF65-F5344CB8AC3E}">
+        <p14:creationId xmlns:p14="http://schemas.microsoft.com/office/powerpoint/2010/main" val="3154590408"/>
+      </p:ext>
+    </p:extLst>
+  </p:cSld>
+  <p:clrMapOvr>
+    <a:masterClrMapping/>
+  </p:clrMapOvr>
+  <p:timing>
+    <p:tnLst>
+      <p:par>
+        <p:cTn id="1" dur="indefinite" restart="never" nodeType="tmRoot"/>
+      </p:par>
+    </p:tnLst>
+  </p:timing>
+</p:sld>
+</file>
+
 <file path=ppt/slides/slide4.xml><?xml version="1.0" encoding="utf-8"?>
 <p:sld xmlns:a="http://schemas.openxmlformats.org/drawingml/2006/main" xmlns:r="http://schemas.openxmlformats.org/officeDocument/2006/relationships" xmlns:p="http://schemas.openxmlformats.org/presentationml/2006/main">
   <p:cSld>
@@ -9489,7 +11441,7 @@
           <a:p>
             <a:fld id="{C04B6024-2702-49B2-98BA-BAE3D8979AA9}" type="datetime2">
               <a:rPr lang="en-US" smtClean="0"/>
-              <a:t>Monday, April 28, 2014</a:t>
+              <a:t>Friday, May 02, 2014</a:t>
             </a:fld>
             <a:endParaRPr lang="en-US" dirty="0"/>
           </a:p>
@@ -9615,6 +11567,1974 @@
 </p:sld>
 </file>
 
+<file path=ppt/slides/slide40.xml><?xml version="1.0" encoding="utf-8"?>
+<p:sld xmlns:a="http://schemas.openxmlformats.org/drawingml/2006/main" xmlns:r="http://schemas.openxmlformats.org/officeDocument/2006/relationships" xmlns:p="http://schemas.openxmlformats.org/presentationml/2006/main">
+  <p:cSld>
+    <p:spTree>
+      <p:nvGrpSpPr>
+        <p:cNvPr id="1" name=""/>
+        <p:cNvGrpSpPr/>
+        <p:nvPr/>
+      </p:nvGrpSpPr>
+      <p:grpSpPr>
+        <a:xfrm>
+          <a:off x="0" y="0"/>
+          <a:ext cx="0" cy="0"/>
+          <a:chOff x="0" y="0"/>
+          <a:chExt cx="0" cy="0"/>
+        </a:xfrm>
+      </p:grpSpPr>
+      <p:sp>
+        <p:nvSpPr>
+          <p:cNvPr id="2" name="Title 1"/>
+          <p:cNvSpPr>
+            <a:spLocks noGrp="1"/>
+          </p:cNvSpPr>
+          <p:nvPr>
+            <p:ph type="title"/>
+          </p:nvPr>
+        </p:nvSpPr>
+        <p:spPr/>
+        <p:txBody>
+          <a:bodyPr/>
+          <a:lstStyle/>
+          <a:p>
+            <a:r>
+              <a:rPr lang="en-US" dirty="0" smtClean="0"/>
+              <a:t>New Project</a:t>
+            </a:r>
+            <a:endParaRPr lang="en-US" dirty="0"/>
+          </a:p>
+        </p:txBody>
+      </p:sp>
+      <p:sp>
+        <p:nvSpPr>
+          <p:cNvPr id="3" name="Date Placeholder 2"/>
+          <p:cNvSpPr>
+            <a:spLocks noGrp="1"/>
+          </p:cNvSpPr>
+          <p:nvPr>
+            <p:ph type="dt" sz="half" idx="10"/>
+          </p:nvPr>
+        </p:nvSpPr>
+        <p:spPr/>
+        <p:txBody>
+          <a:bodyPr/>
+          <a:lstStyle/>
+          <a:p>
+            <a:fld id="{C04B6024-2702-49B2-98BA-BAE3D8979AA9}" type="datetime2">
+              <a:rPr lang="en-US" smtClean="0"/>
+              <a:t>Friday, May 02, 2014</a:t>
+            </a:fld>
+            <a:endParaRPr lang="en-US" dirty="0"/>
+          </a:p>
+        </p:txBody>
+      </p:sp>
+      <p:sp>
+        <p:nvSpPr>
+          <p:cNvPr id="4" name="Footer Placeholder 3"/>
+          <p:cNvSpPr>
+            <a:spLocks noGrp="1"/>
+          </p:cNvSpPr>
+          <p:nvPr>
+            <p:ph type="ftr" sz="quarter" idx="11"/>
+          </p:nvPr>
+        </p:nvSpPr>
+        <p:spPr/>
+        <p:txBody>
+          <a:bodyPr/>
+          <a:lstStyle/>
+          <a:p>
+            <a:r>
+              <a:rPr lang="en-US" smtClean="0"/>
+              <a:t>Palle Cogburn</a:t>
+            </a:r>
+            <a:endParaRPr lang="en-US" dirty="0"/>
+          </a:p>
+        </p:txBody>
+      </p:sp>
+      <p:sp>
+        <p:nvSpPr>
+          <p:cNvPr id="5" name="Slide Number Placeholder 4"/>
+          <p:cNvSpPr>
+            <a:spLocks noGrp="1"/>
+          </p:cNvSpPr>
+          <p:nvPr>
+            <p:ph type="sldNum" sz="quarter" idx="12"/>
+          </p:nvPr>
+        </p:nvSpPr>
+        <p:spPr/>
+        <p:txBody>
+          <a:bodyPr/>
+          <a:lstStyle/>
+          <a:p>
+            <a:fld id="{8CBEA7D5-4322-4BC9-B527-2F0B772A1C61}" type="slidenum">
+              <a:rPr lang="en-US" smtClean="0"/>
+              <a:t>40</a:t>
+            </a:fld>
+            <a:endParaRPr lang="en-US" dirty="0"/>
+          </a:p>
+        </p:txBody>
+      </p:sp>
+      <p:pic>
+        <p:nvPicPr>
+          <p:cNvPr id="2050" name="Picture 2"/>
+          <p:cNvPicPr>
+            <a:picLocks noChangeAspect="1" noChangeArrowheads="1"/>
+          </p:cNvPicPr>
+          <p:nvPr/>
+        </p:nvPicPr>
+        <p:blipFill>
+          <a:blip r:embed="rId2">
+            <a:extLst>
+              <a:ext uri="{28A0092B-C50C-407E-A947-70E740481C1C}">
+                <a14:useLocalDpi xmlns:a14="http://schemas.microsoft.com/office/drawing/2010/main" val="0"/>
+              </a:ext>
+            </a:extLst>
+          </a:blip>
+          <a:srcRect/>
+          <a:stretch>
+            <a:fillRect/>
+          </a:stretch>
+        </p:blipFill>
+        <p:spPr bwMode="auto">
+          <a:xfrm>
+            <a:off x="2362200" y="1219200"/>
+            <a:ext cx="5000625" cy="5219700"/>
+          </a:xfrm>
+          <a:prstGeom prst="rect">
+            <a:avLst/>
+          </a:prstGeom>
+          <a:noFill/>
+          <a:ln>
+            <a:noFill/>
+          </a:ln>
+          <a:extLst>
+            <a:ext uri="{909E8E84-426E-40DD-AFC4-6F175D3DCCD1}">
+              <a14:hiddenFill xmlns:a14="http://schemas.microsoft.com/office/drawing/2010/main">
+                <a:solidFill>
+                  <a:schemeClr val="accent1"/>
+                </a:solidFill>
+              </a14:hiddenFill>
+            </a:ext>
+            <a:ext uri="{91240B29-F687-4F45-9708-019B960494DF}">
+              <a14:hiddenLine xmlns:a14="http://schemas.microsoft.com/office/drawing/2010/main" w="9525">
+                <a:solidFill>
+                  <a:schemeClr val="tx1"/>
+                </a:solidFill>
+                <a:miter lim="800000"/>
+                <a:headEnd/>
+                <a:tailEnd/>
+              </a14:hiddenLine>
+            </a:ext>
+          </a:extLst>
+        </p:spPr>
+      </p:pic>
+    </p:spTree>
+    <p:extLst>
+      <p:ext uri="{BB962C8B-B14F-4D97-AF65-F5344CB8AC3E}">
+        <p14:creationId xmlns:p14="http://schemas.microsoft.com/office/powerpoint/2010/main" val="4234345307"/>
+      </p:ext>
+    </p:extLst>
+  </p:cSld>
+  <p:clrMapOvr>
+    <a:masterClrMapping/>
+  </p:clrMapOvr>
+  <p:timing>
+    <p:tnLst>
+      <p:par>
+        <p:cTn id="1" dur="indefinite" restart="never" nodeType="tmRoot"/>
+      </p:par>
+    </p:tnLst>
+  </p:timing>
+</p:sld>
+</file>
+
+<file path=ppt/slides/slide41.xml><?xml version="1.0" encoding="utf-8"?>
+<p:sld xmlns:a="http://schemas.openxmlformats.org/drawingml/2006/main" xmlns:r="http://schemas.openxmlformats.org/officeDocument/2006/relationships" xmlns:p="http://schemas.openxmlformats.org/presentationml/2006/main">
+  <p:cSld>
+    <p:spTree>
+      <p:nvGrpSpPr>
+        <p:cNvPr id="1" name=""/>
+        <p:cNvGrpSpPr/>
+        <p:nvPr/>
+      </p:nvGrpSpPr>
+      <p:grpSpPr>
+        <a:xfrm>
+          <a:off x="0" y="0"/>
+          <a:ext cx="0" cy="0"/>
+          <a:chOff x="0" y="0"/>
+          <a:chExt cx="0" cy="0"/>
+        </a:xfrm>
+      </p:grpSpPr>
+      <p:sp>
+        <p:nvSpPr>
+          <p:cNvPr id="2" name="Title 1"/>
+          <p:cNvSpPr>
+            <a:spLocks noGrp="1"/>
+          </p:cNvSpPr>
+          <p:nvPr>
+            <p:ph type="title"/>
+          </p:nvPr>
+        </p:nvSpPr>
+        <p:spPr/>
+        <p:txBody>
+          <a:bodyPr/>
+          <a:lstStyle/>
+          <a:p>
+            <a:r>
+              <a:rPr lang="en-US" dirty="0" smtClean="0"/>
+              <a:t>New Project</a:t>
+            </a:r>
+            <a:endParaRPr lang="en-US" dirty="0"/>
+          </a:p>
+        </p:txBody>
+      </p:sp>
+      <p:sp>
+        <p:nvSpPr>
+          <p:cNvPr id="3" name="Date Placeholder 2"/>
+          <p:cNvSpPr>
+            <a:spLocks noGrp="1"/>
+          </p:cNvSpPr>
+          <p:nvPr>
+            <p:ph type="dt" sz="half" idx="10"/>
+          </p:nvPr>
+        </p:nvSpPr>
+        <p:spPr/>
+        <p:txBody>
+          <a:bodyPr/>
+          <a:lstStyle/>
+          <a:p>
+            <a:fld id="{C04B6024-2702-49B2-98BA-BAE3D8979AA9}" type="datetime2">
+              <a:rPr lang="en-US" smtClean="0"/>
+              <a:t>Friday, May 02, 2014</a:t>
+            </a:fld>
+            <a:endParaRPr lang="en-US" dirty="0"/>
+          </a:p>
+        </p:txBody>
+      </p:sp>
+      <p:sp>
+        <p:nvSpPr>
+          <p:cNvPr id="4" name="Footer Placeholder 3"/>
+          <p:cNvSpPr>
+            <a:spLocks noGrp="1"/>
+          </p:cNvSpPr>
+          <p:nvPr>
+            <p:ph type="ftr" sz="quarter" idx="11"/>
+          </p:nvPr>
+        </p:nvSpPr>
+        <p:spPr/>
+        <p:txBody>
+          <a:bodyPr/>
+          <a:lstStyle/>
+          <a:p>
+            <a:r>
+              <a:rPr lang="en-US" smtClean="0"/>
+              <a:t>Palle Cogburn</a:t>
+            </a:r>
+            <a:endParaRPr lang="en-US" dirty="0"/>
+          </a:p>
+        </p:txBody>
+      </p:sp>
+      <p:sp>
+        <p:nvSpPr>
+          <p:cNvPr id="5" name="Slide Number Placeholder 4"/>
+          <p:cNvSpPr>
+            <a:spLocks noGrp="1"/>
+          </p:cNvSpPr>
+          <p:nvPr>
+            <p:ph type="sldNum" sz="quarter" idx="12"/>
+          </p:nvPr>
+        </p:nvSpPr>
+        <p:spPr/>
+        <p:txBody>
+          <a:bodyPr/>
+          <a:lstStyle/>
+          <a:p>
+            <a:fld id="{8CBEA7D5-4322-4BC9-B527-2F0B772A1C61}" type="slidenum">
+              <a:rPr lang="en-US" smtClean="0"/>
+              <a:t>41</a:t>
+            </a:fld>
+            <a:endParaRPr lang="en-US" dirty="0"/>
+          </a:p>
+        </p:txBody>
+      </p:sp>
+      <p:pic>
+        <p:nvPicPr>
+          <p:cNvPr id="3074" name="Picture 2"/>
+          <p:cNvPicPr>
+            <a:picLocks noChangeAspect="1" noChangeArrowheads="1"/>
+          </p:cNvPicPr>
+          <p:nvPr/>
+        </p:nvPicPr>
+        <p:blipFill>
+          <a:blip r:embed="rId2">
+            <a:extLst>
+              <a:ext uri="{28A0092B-C50C-407E-A947-70E740481C1C}">
+                <a14:useLocalDpi xmlns:a14="http://schemas.microsoft.com/office/drawing/2010/main" val="0"/>
+              </a:ext>
+            </a:extLst>
+          </a:blip>
+          <a:srcRect/>
+          <a:stretch>
+            <a:fillRect/>
+          </a:stretch>
+        </p:blipFill>
+        <p:spPr bwMode="auto">
+          <a:xfrm>
+            <a:off x="2209800" y="1447800"/>
+            <a:ext cx="5000625" cy="4762500"/>
+          </a:xfrm>
+          <a:prstGeom prst="rect">
+            <a:avLst/>
+          </a:prstGeom>
+          <a:noFill/>
+          <a:ln>
+            <a:noFill/>
+          </a:ln>
+          <a:extLst>
+            <a:ext uri="{909E8E84-426E-40DD-AFC4-6F175D3DCCD1}">
+              <a14:hiddenFill xmlns:a14="http://schemas.microsoft.com/office/drawing/2010/main">
+                <a:solidFill>
+                  <a:schemeClr val="accent1"/>
+                </a:solidFill>
+              </a14:hiddenFill>
+            </a:ext>
+            <a:ext uri="{91240B29-F687-4F45-9708-019B960494DF}">
+              <a14:hiddenLine xmlns:a14="http://schemas.microsoft.com/office/drawing/2010/main" w="9525">
+                <a:solidFill>
+                  <a:schemeClr val="tx1"/>
+                </a:solidFill>
+                <a:miter lim="800000"/>
+                <a:headEnd/>
+                <a:tailEnd/>
+              </a14:hiddenLine>
+            </a:ext>
+          </a:extLst>
+        </p:spPr>
+      </p:pic>
+    </p:spTree>
+    <p:extLst>
+      <p:ext uri="{BB962C8B-B14F-4D97-AF65-F5344CB8AC3E}">
+        <p14:creationId xmlns:p14="http://schemas.microsoft.com/office/powerpoint/2010/main" val="1595289906"/>
+      </p:ext>
+    </p:extLst>
+  </p:cSld>
+  <p:clrMapOvr>
+    <a:masterClrMapping/>
+  </p:clrMapOvr>
+  <p:timing>
+    <p:tnLst>
+      <p:par>
+        <p:cTn id="1" dur="indefinite" restart="never" nodeType="tmRoot"/>
+      </p:par>
+    </p:tnLst>
+  </p:timing>
+</p:sld>
+</file>
+
+<file path=ppt/slides/slide42.xml><?xml version="1.0" encoding="utf-8"?>
+<p:sld xmlns:a="http://schemas.openxmlformats.org/drawingml/2006/main" xmlns:r="http://schemas.openxmlformats.org/officeDocument/2006/relationships" xmlns:p="http://schemas.openxmlformats.org/presentationml/2006/main">
+  <p:cSld>
+    <p:spTree>
+      <p:nvGrpSpPr>
+        <p:cNvPr id="1" name=""/>
+        <p:cNvGrpSpPr/>
+        <p:nvPr/>
+      </p:nvGrpSpPr>
+      <p:grpSpPr>
+        <a:xfrm>
+          <a:off x="0" y="0"/>
+          <a:ext cx="0" cy="0"/>
+          <a:chOff x="0" y="0"/>
+          <a:chExt cx="0" cy="0"/>
+        </a:xfrm>
+      </p:grpSpPr>
+      <p:sp>
+        <p:nvSpPr>
+          <p:cNvPr id="2" name="Title 1"/>
+          <p:cNvSpPr>
+            <a:spLocks noGrp="1"/>
+          </p:cNvSpPr>
+          <p:nvPr>
+            <p:ph type="title"/>
+          </p:nvPr>
+        </p:nvSpPr>
+        <p:spPr/>
+        <p:txBody>
+          <a:bodyPr/>
+          <a:lstStyle/>
+          <a:p>
+            <a:r>
+              <a:rPr lang="en-US" dirty="0" err="1" smtClean="0"/>
+              <a:t>GitHub</a:t>
+            </a:r>
+            <a:r>
+              <a:rPr lang="en-US" dirty="0" smtClean="0"/>
+              <a:t> user name</a:t>
+            </a:r>
+            <a:endParaRPr lang="en-US" dirty="0"/>
+          </a:p>
+        </p:txBody>
+      </p:sp>
+      <p:sp>
+        <p:nvSpPr>
+          <p:cNvPr id="3" name="Date Placeholder 2"/>
+          <p:cNvSpPr>
+            <a:spLocks noGrp="1"/>
+          </p:cNvSpPr>
+          <p:nvPr>
+            <p:ph type="dt" sz="half" idx="10"/>
+          </p:nvPr>
+        </p:nvSpPr>
+        <p:spPr/>
+        <p:txBody>
+          <a:bodyPr/>
+          <a:lstStyle/>
+          <a:p>
+            <a:fld id="{C04B6024-2702-49B2-98BA-BAE3D8979AA9}" type="datetime2">
+              <a:rPr lang="en-US" smtClean="0"/>
+              <a:t>Friday, May 02, 2014</a:t>
+            </a:fld>
+            <a:endParaRPr lang="en-US" dirty="0"/>
+          </a:p>
+        </p:txBody>
+      </p:sp>
+      <p:sp>
+        <p:nvSpPr>
+          <p:cNvPr id="4" name="Footer Placeholder 3"/>
+          <p:cNvSpPr>
+            <a:spLocks noGrp="1"/>
+          </p:cNvSpPr>
+          <p:nvPr>
+            <p:ph type="ftr" sz="quarter" idx="11"/>
+          </p:nvPr>
+        </p:nvSpPr>
+        <p:spPr/>
+        <p:txBody>
+          <a:bodyPr/>
+          <a:lstStyle/>
+          <a:p>
+            <a:r>
+              <a:rPr lang="en-US" smtClean="0"/>
+              <a:t>Palle Cogburn</a:t>
+            </a:r>
+            <a:endParaRPr lang="en-US" dirty="0"/>
+          </a:p>
+        </p:txBody>
+      </p:sp>
+      <p:sp>
+        <p:nvSpPr>
+          <p:cNvPr id="5" name="Slide Number Placeholder 4"/>
+          <p:cNvSpPr>
+            <a:spLocks noGrp="1"/>
+          </p:cNvSpPr>
+          <p:nvPr>
+            <p:ph type="sldNum" sz="quarter" idx="12"/>
+          </p:nvPr>
+        </p:nvSpPr>
+        <p:spPr/>
+        <p:txBody>
+          <a:bodyPr/>
+          <a:lstStyle/>
+          <a:p>
+            <a:fld id="{8CBEA7D5-4322-4BC9-B527-2F0B772A1C61}" type="slidenum">
+              <a:rPr lang="en-US" smtClean="0"/>
+              <a:t>42</a:t>
+            </a:fld>
+            <a:endParaRPr lang="en-US" dirty="0"/>
+          </a:p>
+        </p:txBody>
+      </p:sp>
+      <p:pic>
+        <p:nvPicPr>
+          <p:cNvPr id="4099" name="Picture 3"/>
+          <p:cNvPicPr>
+            <a:picLocks noChangeAspect="1" noChangeArrowheads="1"/>
+          </p:cNvPicPr>
+          <p:nvPr/>
+        </p:nvPicPr>
+        <p:blipFill>
+          <a:blip r:embed="rId2">
+            <a:extLst>
+              <a:ext uri="{28A0092B-C50C-407E-A947-70E740481C1C}">
+                <a14:useLocalDpi xmlns:a14="http://schemas.microsoft.com/office/drawing/2010/main" val="0"/>
+              </a:ext>
+            </a:extLst>
+          </a:blip>
+          <a:srcRect/>
+          <a:stretch>
+            <a:fillRect/>
+          </a:stretch>
+        </p:blipFill>
+        <p:spPr bwMode="auto">
+          <a:xfrm>
+            <a:off x="685800" y="1752600"/>
+            <a:ext cx="3409950" cy="2171700"/>
+          </a:xfrm>
+          <a:prstGeom prst="rect">
+            <a:avLst/>
+          </a:prstGeom>
+          <a:noFill/>
+          <a:ln>
+            <a:noFill/>
+          </a:ln>
+          <a:extLst>
+            <a:ext uri="{909E8E84-426E-40DD-AFC4-6F175D3DCCD1}">
+              <a14:hiddenFill xmlns:a14="http://schemas.microsoft.com/office/drawing/2010/main">
+                <a:solidFill>
+                  <a:schemeClr val="accent1"/>
+                </a:solidFill>
+              </a14:hiddenFill>
+            </a:ext>
+            <a:ext uri="{91240B29-F687-4F45-9708-019B960494DF}">
+              <a14:hiddenLine xmlns:a14="http://schemas.microsoft.com/office/drawing/2010/main" w="9525">
+                <a:solidFill>
+                  <a:schemeClr val="tx1"/>
+                </a:solidFill>
+                <a:miter lim="800000"/>
+                <a:headEnd/>
+                <a:tailEnd/>
+              </a14:hiddenLine>
+            </a:ext>
+          </a:extLst>
+        </p:spPr>
+      </p:pic>
+    </p:spTree>
+    <p:extLst>
+      <p:ext uri="{BB962C8B-B14F-4D97-AF65-F5344CB8AC3E}">
+        <p14:creationId xmlns:p14="http://schemas.microsoft.com/office/powerpoint/2010/main" val="3396704870"/>
+      </p:ext>
+    </p:extLst>
+  </p:cSld>
+  <p:clrMapOvr>
+    <a:masterClrMapping/>
+  </p:clrMapOvr>
+  <p:timing>
+    <p:tnLst>
+      <p:par>
+        <p:cTn id="1" dur="indefinite" restart="never" nodeType="tmRoot"/>
+      </p:par>
+    </p:tnLst>
+  </p:timing>
+</p:sld>
+</file>
+
+<file path=ppt/slides/slide43.xml><?xml version="1.0" encoding="utf-8"?>
+<p:sld xmlns:a="http://schemas.openxmlformats.org/drawingml/2006/main" xmlns:r="http://schemas.openxmlformats.org/officeDocument/2006/relationships" xmlns:p="http://schemas.openxmlformats.org/presentationml/2006/main">
+  <p:cSld>
+    <p:spTree>
+      <p:nvGrpSpPr>
+        <p:cNvPr id="1" name=""/>
+        <p:cNvGrpSpPr/>
+        <p:nvPr/>
+      </p:nvGrpSpPr>
+      <p:grpSpPr>
+        <a:xfrm>
+          <a:off x="0" y="0"/>
+          <a:ext cx="0" cy="0"/>
+          <a:chOff x="0" y="0"/>
+          <a:chExt cx="0" cy="0"/>
+        </a:xfrm>
+      </p:grpSpPr>
+      <p:sp>
+        <p:nvSpPr>
+          <p:cNvPr id="2" name="Title 1"/>
+          <p:cNvSpPr>
+            <a:spLocks noGrp="1"/>
+          </p:cNvSpPr>
+          <p:nvPr>
+            <p:ph type="title"/>
+          </p:nvPr>
+        </p:nvSpPr>
+        <p:spPr/>
+        <p:txBody>
+          <a:bodyPr/>
+          <a:lstStyle/>
+          <a:p>
+            <a:r>
+              <a:rPr lang="en-US" dirty="0" smtClean="0"/>
+              <a:t>Share</a:t>
+            </a:r>
+            <a:endParaRPr lang="en-US" dirty="0"/>
+          </a:p>
+        </p:txBody>
+      </p:sp>
+      <p:sp>
+        <p:nvSpPr>
+          <p:cNvPr id="3" name="Date Placeholder 2"/>
+          <p:cNvSpPr>
+            <a:spLocks noGrp="1"/>
+          </p:cNvSpPr>
+          <p:nvPr>
+            <p:ph type="dt" sz="half" idx="10"/>
+          </p:nvPr>
+        </p:nvSpPr>
+        <p:spPr/>
+        <p:txBody>
+          <a:bodyPr/>
+          <a:lstStyle/>
+          <a:p>
+            <a:fld id="{C04B6024-2702-49B2-98BA-BAE3D8979AA9}" type="datetime2">
+              <a:rPr lang="en-US" smtClean="0"/>
+              <a:t>Friday, May 02, 2014</a:t>
+            </a:fld>
+            <a:endParaRPr lang="en-US" dirty="0"/>
+          </a:p>
+        </p:txBody>
+      </p:sp>
+      <p:sp>
+        <p:nvSpPr>
+          <p:cNvPr id="4" name="Footer Placeholder 3"/>
+          <p:cNvSpPr>
+            <a:spLocks noGrp="1"/>
+          </p:cNvSpPr>
+          <p:nvPr>
+            <p:ph type="ftr" sz="quarter" idx="11"/>
+          </p:nvPr>
+        </p:nvSpPr>
+        <p:spPr/>
+        <p:txBody>
+          <a:bodyPr/>
+          <a:lstStyle/>
+          <a:p>
+            <a:r>
+              <a:rPr lang="en-US" smtClean="0"/>
+              <a:t>Palle Cogburn</a:t>
+            </a:r>
+            <a:endParaRPr lang="en-US" dirty="0"/>
+          </a:p>
+        </p:txBody>
+      </p:sp>
+      <p:sp>
+        <p:nvSpPr>
+          <p:cNvPr id="5" name="Slide Number Placeholder 4"/>
+          <p:cNvSpPr>
+            <a:spLocks noGrp="1"/>
+          </p:cNvSpPr>
+          <p:nvPr>
+            <p:ph type="sldNum" sz="quarter" idx="12"/>
+          </p:nvPr>
+        </p:nvSpPr>
+        <p:spPr/>
+        <p:txBody>
+          <a:bodyPr/>
+          <a:lstStyle/>
+          <a:p>
+            <a:fld id="{8CBEA7D5-4322-4BC9-B527-2F0B772A1C61}" type="slidenum">
+              <a:rPr lang="en-US" smtClean="0"/>
+              <a:t>43</a:t>
+            </a:fld>
+            <a:endParaRPr lang="en-US" dirty="0"/>
+          </a:p>
+        </p:txBody>
+      </p:sp>
+      <p:pic>
+        <p:nvPicPr>
+          <p:cNvPr id="5122" name="Picture 2"/>
+          <p:cNvPicPr>
+            <a:picLocks noChangeAspect="1" noChangeArrowheads="1"/>
+          </p:cNvPicPr>
+          <p:nvPr/>
+        </p:nvPicPr>
+        <p:blipFill rotWithShape="1">
+          <a:blip r:embed="rId2">
+            <a:extLst>
+              <a:ext uri="{28A0092B-C50C-407E-A947-70E740481C1C}">
+                <a14:useLocalDpi xmlns:a14="http://schemas.microsoft.com/office/drawing/2010/main" val="0"/>
+              </a:ext>
+            </a:extLst>
+          </a:blip>
+          <a:srcRect t="80950"/>
+          <a:stretch/>
+        </p:blipFill>
+        <p:spPr bwMode="auto">
+          <a:xfrm>
+            <a:off x="1971675" y="3124200"/>
+            <a:ext cx="5200650" cy="1050608"/>
+          </a:xfrm>
+          <a:prstGeom prst="rect">
+            <a:avLst/>
+          </a:prstGeom>
+          <a:noFill/>
+          <a:ln>
+            <a:noFill/>
+          </a:ln>
+          <a:extLst>
+            <a:ext uri="{909E8E84-426E-40DD-AFC4-6F175D3DCCD1}">
+              <a14:hiddenFill xmlns:a14="http://schemas.microsoft.com/office/drawing/2010/main">
+                <a:solidFill>
+                  <a:schemeClr val="accent1"/>
+                </a:solidFill>
+              </a14:hiddenFill>
+            </a:ext>
+            <a:ext uri="{91240B29-F687-4F45-9708-019B960494DF}">
+              <a14:hiddenLine xmlns:a14="http://schemas.microsoft.com/office/drawing/2010/main" w="9525">
+                <a:solidFill>
+                  <a:schemeClr val="tx1"/>
+                </a:solidFill>
+                <a:miter lim="800000"/>
+                <a:headEnd/>
+                <a:tailEnd/>
+              </a14:hiddenLine>
+            </a:ext>
+          </a:extLst>
+        </p:spPr>
+      </p:pic>
+      <p:pic>
+        <p:nvPicPr>
+          <p:cNvPr id="7" name="Picture 2"/>
+          <p:cNvPicPr>
+            <a:picLocks noChangeAspect="1" noChangeArrowheads="1"/>
+          </p:cNvPicPr>
+          <p:nvPr/>
+        </p:nvPicPr>
+        <p:blipFill rotWithShape="1">
+          <a:blip r:embed="rId2">
+            <a:extLst>
+              <a:ext uri="{28A0092B-C50C-407E-A947-70E740481C1C}">
+                <a14:useLocalDpi xmlns:a14="http://schemas.microsoft.com/office/drawing/2010/main" val="0"/>
+              </a:ext>
+            </a:extLst>
+          </a:blip>
+          <a:srcRect t="276" b="72090"/>
+          <a:stretch/>
+        </p:blipFill>
+        <p:spPr bwMode="auto">
+          <a:xfrm>
+            <a:off x="1971675" y="1371600"/>
+            <a:ext cx="5200650" cy="1524000"/>
+          </a:xfrm>
+          <a:prstGeom prst="rect">
+            <a:avLst/>
+          </a:prstGeom>
+          <a:noFill/>
+          <a:ln>
+            <a:noFill/>
+          </a:ln>
+          <a:extLst>
+            <a:ext uri="{909E8E84-426E-40DD-AFC4-6F175D3DCCD1}">
+              <a14:hiddenFill xmlns:a14="http://schemas.microsoft.com/office/drawing/2010/main">
+                <a:solidFill>
+                  <a:schemeClr val="accent1"/>
+                </a:solidFill>
+              </a14:hiddenFill>
+            </a:ext>
+            <a:ext uri="{91240B29-F687-4F45-9708-019B960494DF}">
+              <a14:hiddenLine xmlns:a14="http://schemas.microsoft.com/office/drawing/2010/main" w="9525">
+                <a:solidFill>
+                  <a:schemeClr val="tx1"/>
+                </a:solidFill>
+                <a:miter lim="800000"/>
+                <a:headEnd/>
+                <a:tailEnd/>
+              </a14:hiddenLine>
+            </a:ext>
+          </a:extLst>
+        </p:spPr>
+      </p:pic>
+    </p:spTree>
+    <p:extLst>
+      <p:ext uri="{BB962C8B-B14F-4D97-AF65-F5344CB8AC3E}">
+        <p14:creationId xmlns:p14="http://schemas.microsoft.com/office/powerpoint/2010/main" val="418677685"/>
+      </p:ext>
+    </p:extLst>
+  </p:cSld>
+  <p:clrMapOvr>
+    <a:masterClrMapping/>
+  </p:clrMapOvr>
+  <p:timing>
+    <p:tnLst>
+      <p:par>
+        <p:cTn id="1" dur="indefinite" restart="never" nodeType="tmRoot"/>
+      </p:par>
+    </p:tnLst>
+  </p:timing>
+</p:sld>
+</file>
+
+<file path=ppt/slides/slide44.xml><?xml version="1.0" encoding="utf-8"?>
+<p:sld xmlns:a="http://schemas.openxmlformats.org/drawingml/2006/main" xmlns:r="http://schemas.openxmlformats.org/officeDocument/2006/relationships" xmlns:p="http://schemas.openxmlformats.org/presentationml/2006/main">
+  <p:cSld>
+    <p:spTree>
+      <p:nvGrpSpPr>
+        <p:cNvPr id="1" name=""/>
+        <p:cNvGrpSpPr/>
+        <p:nvPr/>
+      </p:nvGrpSpPr>
+      <p:grpSpPr>
+        <a:xfrm>
+          <a:off x="0" y="0"/>
+          <a:ext cx="0" cy="0"/>
+          <a:chOff x="0" y="0"/>
+          <a:chExt cx="0" cy="0"/>
+        </a:xfrm>
+      </p:grpSpPr>
+      <p:sp>
+        <p:nvSpPr>
+          <p:cNvPr id="2" name="Title 1"/>
+          <p:cNvSpPr>
+            <a:spLocks noGrp="1"/>
+          </p:cNvSpPr>
+          <p:nvPr>
+            <p:ph type="title"/>
+          </p:nvPr>
+        </p:nvSpPr>
+        <p:spPr/>
+        <p:txBody>
+          <a:bodyPr/>
+          <a:lstStyle/>
+          <a:p>
+            <a:r>
+              <a:rPr lang="en-US" dirty="0" smtClean="0"/>
+              <a:t>On </a:t>
+            </a:r>
+            <a:r>
+              <a:rPr lang="en-US" dirty="0" err="1" smtClean="0"/>
+              <a:t>Github</a:t>
+            </a:r>
+            <a:endParaRPr lang="en-US" dirty="0"/>
+          </a:p>
+        </p:txBody>
+      </p:sp>
+      <p:sp>
+        <p:nvSpPr>
+          <p:cNvPr id="3" name="Date Placeholder 2"/>
+          <p:cNvSpPr>
+            <a:spLocks noGrp="1"/>
+          </p:cNvSpPr>
+          <p:nvPr>
+            <p:ph type="dt" sz="half" idx="10"/>
+          </p:nvPr>
+        </p:nvSpPr>
+        <p:spPr/>
+        <p:txBody>
+          <a:bodyPr/>
+          <a:lstStyle/>
+          <a:p>
+            <a:fld id="{C04B6024-2702-49B2-98BA-BAE3D8979AA9}" type="datetime2">
+              <a:rPr lang="en-US" smtClean="0"/>
+              <a:t>Friday, May 02, 2014</a:t>
+            </a:fld>
+            <a:endParaRPr lang="en-US" dirty="0"/>
+          </a:p>
+        </p:txBody>
+      </p:sp>
+      <p:sp>
+        <p:nvSpPr>
+          <p:cNvPr id="4" name="Footer Placeholder 3"/>
+          <p:cNvSpPr>
+            <a:spLocks noGrp="1"/>
+          </p:cNvSpPr>
+          <p:nvPr>
+            <p:ph type="ftr" sz="quarter" idx="11"/>
+          </p:nvPr>
+        </p:nvSpPr>
+        <p:spPr/>
+        <p:txBody>
+          <a:bodyPr/>
+          <a:lstStyle/>
+          <a:p>
+            <a:r>
+              <a:rPr lang="en-US" smtClean="0"/>
+              <a:t>Palle Cogburn</a:t>
+            </a:r>
+            <a:endParaRPr lang="en-US" dirty="0"/>
+          </a:p>
+        </p:txBody>
+      </p:sp>
+      <p:sp>
+        <p:nvSpPr>
+          <p:cNvPr id="5" name="Slide Number Placeholder 4"/>
+          <p:cNvSpPr>
+            <a:spLocks noGrp="1"/>
+          </p:cNvSpPr>
+          <p:nvPr>
+            <p:ph type="sldNum" sz="quarter" idx="12"/>
+          </p:nvPr>
+        </p:nvSpPr>
+        <p:spPr/>
+        <p:txBody>
+          <a:bodyPr/>
+          <a:lstStyle/>
+          <a:p>
+            <a:fld id="{8CBEA7D5-4322-4BC9-B527-2F0B772A1C61}" type="slidenum">
+              <a:rPr lang="en-US" smtClean="0"/>
+              <a:t>44</a:t>
+            </a:fld>
+            <a:endParaRPr lang="en-US" dirty="0"/>
+          </a:p>
+        </p:txBody>
+      </p:sp>
+      <p:pic>
+        <p:nvPicPr>
+          <p:cNvPr id="1026" name="Picture 2"/>
+          <p:cNvPicPr>
+            <a:picLocks noChangeAspect="1" noChangeArrowheads="1"/>
+          </p:cNvPicPr>
+          <p:nvPr/>
+        </p:nvPicPr>
+        <p:blipFill>
+          <a:blip r:embed="rId2">
+            <a:extLst>
+              <a:ext uri="{28A0092B-C50C-407E-A947-70E740481C1C}">
+                <a14:useLocalDpi xmlns:a14="http://schemas.microsoft.com/office/drawing/2010/main" val="0"/>
+              </a:ext>
+            </a:extLst>
+          </a:blip>
+          <a:srcRect/>
+          <a:stretch>
+            <a:fillRect/>
+          </a:stretch>
+        </p:blipFill>
+        <p:spPr bwMode="auto">
+          <a:xfrm>
+            <a:off x="2071688" y="1371600"/>
+            <a:ext cx="5000625" cy="4114800"/>
+          </a:xfrm>
+          <a:prstGeom prst="rect">
+            <a:avLst/>
+          </a:prstGeom>
+          <a:noFill/>
+          <a:ln>
+            <a:noFill/>
+          </a:ln>
+          <a:extLst>
+            <a:ext uri="{909E8E84-426E-40DD-AFC4-6F175D3DCCD1}">
+              <a14:hiddenFill xmlns:a14="http://schemas.microsoft.com/office/drawing/2010/main">
+                <a:solidFill>
+                  <a:schemeClr val="accent1"/>
+                </a:solidFill>
+              </a14:hiddenFill>
+            </a:ext>
+            <a:ext uri="{91240B29-F687-4F45-9708-019B960494DF}">
+              <a14:hiddenLine xmlns:a14="http://schemas.microsoft.com/office/drawing/2010/main" w="9525">
+                <a:solidFill>
+                  <a:schemeClr val="tx1"/>
+                </a:solidFill>
+                <a:miter lim="800000"/>
+                <a:headEnd/>
+                <a:tailEnd/>
+              </a14:hiddenLine>
+            </a:ext>
+          </a:extLst>
+        </p:spPr>
+      </p:pic>
+    </p:spTree>
+    <p:extLst>
+      <p:ext uri="{BB962C8B-B14F-4D97-AF65-F5344CB8AC3E}">
+        <p14:creationId xmlns:p14="http://schemas.microsoft.com/office/powerpoint/2010/main" val="2477919990"/>
+      </p:ext>
+    </p:extLst>
+  </p:cSld>
+  <p:clrMapOvr>
+    <a:masterClrMapping/>
+  </p:clrMapOvr>
+  <p:timing>
+    <p:tnLst>
+      <p:par>
+        <p:cTn id="1" dur="indefinite" restart="never" nodeType="tmRoot"/>
+      </p:par>
+    </p:tnLst>
+  </p:timing>
+</p:sld>
+</file>
+
+<file path=ppt/slides/slide45.xml><?xml version="1.0" encoding="utf-8"?>
+<p:sld xmlns:a="http://schemas.openxmlformats.org/drawingml/2006/main" xmlns:r="http://schemas.openxmlformats.org/officeDocument/2006/relationships" xmlns:p="http://schemas.openxmlformats.org/presentationml/2006/main">
+  <p:cSld>
+    <p:spTree>
+      <p:nvGrpSpPr>
+        <p:cNvPr id="1" name=""/>
+        <p:cNvGrpSpPr/>
+        <p:nvPr/>
+      </p:nvGrpSpPr>
+      <p:grpSpPr>
+        <a:xfrm>
+          <a:off x="0" y="0"/>
+          <a:ext cx="0" cy="0"/>
+          <a:chOff x="0" y="0"/>
+          <a:chExt cx="0" cy="0"/>
+        </a:xfrm>
+      </p:grpSpPr>
+      <p:sp>
+        <p:nvSpPr>
+          <p:cNvPr id="2" name="Title 1"/>
+          <p:cNvSpPr>
+            <a:spLocks noGrp="1"/>
+          </p:cNvSpPr>
+          <p:nvPr>
+            <p:ph type="title"/>
+          </p:nvPr>
+        </p:nvSpPr>
+        <p:spPr/>
+        <p:txBody>
+          <a:bodyPr/>
+          <a:lstStyle/>
+          <a:p>
+            <a:r>
+              <a:rPr lang="en-US" dirty="0" smtClean="0"/>
+              <a:t>On </a:t>
+            </a:r>
+            <a:r>
+              <a:rPr lang="en-US" dirty="0" err="1" smtClean="0"/>
+              <a:t>Github</a:t>
+            </a:r>
+            <a:endParaRPr lang="en-US" dirty="0"/>
+          </a:p>
+        </p:txBody>
+      </p:sp>
+      <p:sp>
+        <p:nvSpPr>
+          <p:cNvPr id="3" name="Date Placeholder 2"/>
+          <p:cNvSpPr>
+            <a:spLocks noGrp="1"/>
+          </p:cNvSpPr>
+          <p:nvPr>
+            <p:ph type="dt" sz="half" idx="10"/>
+          </p:nvPr>
+        </p:nvSpPr>
+        <p:spPr/>
+        <p:txBody>
+          <a:bodyPr/>
+          <a:lstStyle/>
+          <a:p>
+            <a:fld id="{C04B6024-2702-49B2-98BA-BAE3D8979AA9}" type="datetime2">
+              <a:rPr lang="en-US" smtClean="0"/>
+              <a:t>Friday, May 02, 2014</a:t>
+            </a:fld>
+            <a:endParaRPr lang="en-US" dirty="0"/>
+          </a:p>
+        </p:txBody>
+      </p:sp>
+      <p:sp>
+        <p:nvSpPr>
+          <p:cNvPr id="4" name="Footer Placeholder 3"/>
+          <p:cNvSpPr>
+            <a:spLocks noGrp="1"/>
+          </p:cNvSpPr>
+          <p:nvPr>
+            <p:ph type="ftr" sz="quarter" idx="11"/>
+          </p:nvPr>
+        </p:nvSpPr>
+        <p:spPr/>
+        <p:txBody>
+          <a:bodyPr/>
+          <a:lstStyle/>
+          <a:p>
+            <a:r>
+              <a:rPr lang="en-US" smtClean="0"/>
+              <a:t>Palle Cogburn</a:t>
+            </a:r>
+            <a:endParaRPr lang="en-US" dirty="0"/>
+          </a:p>
+        </p:txBody>
+      </p:sp>
+      <p:sp>
+        <p:nvSpPr>
+          <p:cNvPr id="5" name="Slide Number Placeholder 4"/>
+          <p:cNvSpPr>
+            <a:spLocks noGrp="1"/>
+          </p:cNvSpPr>
+          <p:nvPr>
+            <p:ph type="sldNum" sz="quarter" idx="12"/>
+          </p:nvPr>
+        </p:nvSpPr>
+        <p:spPr/>
+        <p:txBody>
+          <a:bodyPr/>
+          <a:lstStyle/>
+          <a:p>
+            <a:fld id="{8CBEA7D5-4322-4BC9-B527-2F0B772A1C61}" type="slidenum">
+              <a:rPr lang="en-US" smtClean="0"/>
+              <a:t>45</a:t>
+            </a:fld>
+            <a:endParaRPr lang="en-US" dirty="0"/>
+          </a:p>
+        </p:txBody>
+      </p:sp>
+      <p:pic>
+        <p:nvPicPr>
+          <p:cNvPr id="2050" name="Picture 2"/>
+          <p:cNvPicPr>
+            <a:picLocks noChangeAspect="1" noChangeArrowheads="1"/>
+          </p:cNvPicPr>
+          <p:nvPr/>
+        </p:nvPicPr>
+        <p:blipFill>
+          <a:blip r:embed="rId2">
+            <a:extLst>
+              <a:ext uri="{28A0092B-C50C-407E-A947-70E740481C1C}">
+                <a14:useLocalDpi xmlns:a14="http://schemas.microsoft.com/office/drawing/2010/main" val="0"/>
+              </a:ext>
+            </a:extLst>
+          </a:blip>
+          <a:srcRect/>
+          <a:stretch>
+            <a:fillRect/>
+          </a:stretch>
+        </p:blipFill>
+        <p:spPr bwMode="auto">
+          <a:xfrm>
+            <a:off x="966788" y="1295400"/>
+            <a:ext cx="7210425" cy="4733925"/>
+          </a:xfrm>
+          <a:prstGeom prst="rect">
+            <a:avLst/>
+          </a:prstGeom>
+          <a:noFill/>
+          <a:ln>
+            <a:noFill/>
+          </a:ln>
+          <a:extLst>
+            <a:ext uri="{909E8E84-426E-40DD-AFC4-6F175D3DCCD1}">
+              <a14:hiddenFill xmlns:a14="http://schemas.microsoft.com/office/drawing/2010/main">
+                <a:solidFill>
+                  <a:schemeClr val="accent1"/>
+                </a:solidFill>
+              </a14:hiddenFill>
+            </a:ext>
+            <a:ext uri="{91240B29-F687-4F45-9708-019B960494DF}">
+              <a14:hiddenLine xmlns:a14="http://schemas.microsoft.com/office/drawing/2010/main" w="9525">
+                <a:solidFill>
+                  <a:schemeClr val="tx1"/>
+                </a:solidFill>
+                <a:miter lim="800000"/>
+                <a:headEnd/>
+                <a:tailEnd/>
+              </a14:hiddenLine>
+            </a:ext>
+          </a:extLst>
+        </p:spPr>
+      </p:pic>
+    </p:spTree>
+    <p:extLst>
+      <p:ext uri="{BB962C8B-B14F-4D97-AF65-F5344CB8AC3E}">
+        <p14:creationId xmlns:p14="http://schemas.microsoft.com/office/powerpoint/2010/main" val="1966441553"/>
+      </p:ext>
+    </p:extLst>
+  </p:cSld>
+  <p:clrMapOvr>
+    <a:masterClrMapping/>
+  </p:clrMapOvr>
+  <p:timing>
+    <p:tnLst>
+      <p:par>
+        <p:cTn id="1" dur="indefinite" restart="never" nodeType="tmRoot"/>
+      </p:par>
+    </p:tnLst>
+  </p:timing>
+</p:sld>
+</file>
+
+<file path=ppt/slides/slide46.xml><?xml version="1.0" encoding="utf-8"?>
+<p:sld xmlns:a="http://schemas.openxmlformats.org/drawingml/2006/main" xmlns:r="http://schemas.openxmlformats.org/officeDocument/2006/relationships" xmlns:p="http://schemas.openxmlformats.org/presentationml/2006/main">
+  <p:cSld>
+    <p:spTree>
+      <p:nvGrpSpPr>
+        <p:cNvPr id="1" name=""/>
+        <p:cNvGrpSpPr/>
+        <p:nvPr/>
+      </p:nvGrpSpPr>
+      <p:grpSpPr>
+        <a:xfrm>
+          <a:off x="0" y="0"/>
+          <a:ext cx="0" cy="0"/>
+          <a:chOff x="0" y="0"/>
+          <a:chExt cx="0" cy="0"/>
+        </a:xfrm>
+      </p:grpSpPr>
+      <p:sp>
+        <p:nvSpPr>
+          <p:cNvPr id="2" name="Title 1"/>
+          <p:cNvSpPr>
+            <a:spLocks noGrp="1"/>
+          </p:cNvSpPr>
+          <p:nvPr>
+            <p:ph type="title"/>
+          </p:nvPr>
+        </p:nvSpPr>
+        <p:spPr/>
+        <p:txBody>
+          <a:bodyPr/>
+          <a:lstStyle/>
+          <a:p>
+            <a:r>
+              <a:rPr lang="en-US" dirty="0" smtClean="0"/>
+              <a:t>Push</a:t>
+            </a:r>
+            <a:endParaRPr lang="en-US" dirty="0"/>
+          </a:p>
+        </p:txBody>
+      </p:sp>
+      <p:sp>
+        <p:nvSpPr>
+          <p:cNvPr id="3" name="Date Placeholder 2"/>
+          <p:cNvSpPr>
+            <a:spLocks noGrp="1"/>
+          </p:cNvSpPr>
+          <p:nvPr>
+            <p:ph type="dt" sz="half" idx="10"/>
+          </p:nvPr>
+        </p:nvSpPr>
+        <p:spPr/>
+        <p:txBody>
+          <a:bodyPr/>
+          <a:lstStyle/>
+          <a:p>
+            <a:fld id="{C04B6024-2702-49B2-98BA-BAE3D8979AA9}" type="datetime2">
+              <a:rPr lang="en-US" smtClean="0"/>
+              <a:t>Friday, May 02, 2014</a:t>
+            </a:fld>
+            <a:endParaRPr lang="en-US" dirty="0"/>
+          </a:p>
+        </p:txBody>
+      </p:sp>
+      <p:sp>
+        <p:nvSpPr>
+          <p:cNvPr id="4" name="Footer Placeholder 3"/>
+          <p:cNvSpPr>
+            <a:spLocks noGrp="1"/>
+          </p:cNvSpPr>
+          <p:nvPr>
+            <p:ph type="ftr" sz="quarter" idx="11"/>
+          </p:nvPr>
+        </p:nvSpPr>
+        <p:spPr/>
+        <p:txBody>
+          <a:bodyPr/>
+          <a:lstStyle/>
+          <a:p>
+            <a:r>
+              <a:rPr lang="en-US" smtClean="0"/>
+              <a:t>Palle Cogburn</a:t>
+            </a:r>
+            <a:endParaRPr lang="en-US" dirty="0"/>
+          </a:p>
+        </p:txBody>
+      </p:sp>
+      <p:sp>
+        <p:nvSpPr>
+          <p:cNvPr id="5" name="Slide Number Placeholder 4"/>
+          <p:cNvSpPr>
+            <a:spLocks noGrp="1"/>
+          </p:cNvSpPr>
+          <p:nvPr>
+            <p:ph type="sldNum" sz="quarter" idx="12"/>
+          </p:nvPr>
+        </p:nvSpPr>
+        <p:spPr/>
+        <p:txBody>
+          <a:bodyPr/>
+          <a:lstStyle/>
+          <a:p>
+            <a:fld id="{8CBEA7D5-4322-4BC9-B527-2F0B772A1C61}" type="slidenum">
+              <a:rPr lang="en-US" smtClean="0"/>
+              <a:t>46</a:t>
+            </a:fld>
+            <a:endParaRPr lang="en-US" dirty="0"/>
+          </a:p>
+        </p:txBody>
+      </p:sp>
+      <p:pic>
+        <p:nvPicPr>
+          <p:cNvPr id="3074" name="Picture 2"/>
+          <p:cNvPicPr>
+            <a:picLocks noChangeAspect="1" noChangeArrowheads="1"/>
+          </p:cNvPicPr>
+          <p:nvPr/>
+        </p:nvPicPr>
+        <p:blipFill>
+          <a:blip r:embed="rId2">
+            <a:extLst>
+              <a:ext uri="{28A0092B-C50C-407E-A947-70E740481C1C}">
+                <a14:useLocalDpi xmlns:a14="http://schemas.microsoft.com/office/drawing/2010/main" val="0"/>
+              </a:ext>
+            </a:extLst>
+          </a:blip>
+          <a:srcRect/>
+          <a:stretch>
+            <a:fillRect/>
+          </a:stretch>
+        </p:blipFill>
+        <p:spPr bwMode="auto">
+          <a:xfrm>
+            <a:off x="2743200" y="1481884"/>
+            <a:ext cx="4405313" cy="4690315"/>
+          </a:xfrm>
+          <a:prstGeom prst="rect">
+            <a:avLst/>
+          </a:prstGeom>
+          <a:noFill/>
+          <a:ln>
+            <a:noFill/>
+          </a:ln>
+          <a:extLst>
+            <a:ext uri="{909E8E84-426E-40DD-AFC4-6F175D3DCCD1}">
+              <a14:hiddenFill xmlns:a14="http://schemas.microsoft.com/office/drawing/2010/main">
+                <a:solidFill>
+                  <a:schemeClr val="accent1"/>
+                </a:solidFill>
+              </a14:hiddenFill>
+            </a:ext>
+            <a:ext uri="{91240B29-F687-4F45-9708-019B960494DF}">
+              <a14:hiddenLine xmlns:a14="http://schemas.microsoft.com/office/drawing/2010/main" w="9525">
+                <a:solidFill>
+                  <a:schemeClr val="tx1"/>
+                </a:solidFill>
+                <a:miter lim="800000"/>
+                <a:headEnd/>
+                <a:tailEnd/>
+              </a14:hiddenLine>
+            </a:ext>
+          </a:extLst>
+        </p:spPr>
+      </p:pic>
+    </p:spTree>
+    <p:extLst>
+      <p:ext uri="{BB962C8B-B14F-4D97-AF65-F5344CB8AC3E}">
+        <p14:creationId xmlns:p14="http://schemas.microsoft.com/office/powerpoint/2010/main" val="3666636276"/>
+      </p:ext>
+    </p:extLst>
+  </p:cSld>
+  <p:clrMapOvr>
+    <a:masterClrMapping/>
+  </p:clrMapOvr>
+  <p:timing>
+    <p:tnLst>
+      <p:par>
+        <p:cTn id="1" dur="indefinite" restart="never" nodeType="tmRoot"/>
+      </p:par>
+    </p:tnLst>
+  </p:timing>
+</p:sld>
+</file>
+
+<file path=ppt/slides/slide47.xml><?xml version="1.0" encoding="utf-8"?>
+<p:sld xmlns:a="http://schemas.openxmlformats.org/drawingml/2006/main" xmlns:r="http://schemas.openxmlformats.org/officeDocument/2006/relationships" xmlns:p="http://schemas.openxmlformats.org/presentationml/2006/main">
+  <p:cSld>
+    <p:spTree>
+      <p:nvGrpSpPr>
+        <p:cNvPr id="1" name=""/>
+        <p:cNvGrpSpPr/>
+        <p:nvPr/>
+      </p:nvGrpSpPr>
+      <p:grpSpPr>
+        <a:xfrm>
+          <a:off x="0" y="0"/>
+          <a:ext cx="0" cy="0"/>
+          <a:chOff x="0" y="0"/>
+          <a:chExt cx="0" cy="0"/>
+        </a:xfrm>
+      </p:grpSpPr>
+      <p:sp>
+        <p:nvSpPr>
+          <p:cNvPr id="2" name="Title 1"/>
+          <p:cNvSpPr>
+            <a:spLocks noGrp="1"/>
+          </p:cNvSpPr>
+          <p:nvPr>
+            <p:ph type="title"/>
+          </p:nvPr>
+        </p:nvSpPr>
+        <p:spPr/>
+        <p:txBody>
+          <a:bodyPr/>
+          <a:lstStyle/>
+          <a:p>
+            <a:r>
+              <a:rPr lang="en-US" dirty="0" smtClean="0"/>
+              <a:t>Push</a:t>
+            </a:r>
+            <a:endParaRPr lang="en-US" dirty="0"/>
+          </a:p>
+        </p:txBody>
+      </p:sp>
+      <p:sp>
+        <p:nvSpPr>
+          <p:cNvPr id="3" name="Date Placeholder 2"/>
+          <p:cNvSpPr>
+            <a:spLocks noGrp="1"/>
+          </p:cNvSpPr>
+          <p:nvPr>
+            <p:ph type="dt" sz="half" idx="10"/>
+          </p:nvPr>
+        </p:nvSpPr>
+        <p:spPr/>
+        <p:txBody>
+          <a:bodyPr/>
+          <a:lstStyle/>
+          <a:p>
+            <a:fld id="{C04B6024-2702-49B2-98BA-BAE3D8979AA9}" type="datetime2">
+              <a:rPr lang="en-US" smtClean="0"/>
+              <a:t>Friday, May 02, 2014</a:t>
+            </a:fld>
+            <a:endParaRPr lang="en-US" dirty="0"/>
+          </a:p>
+        </p:txBody>
+      </p:sp>
+      <p:sp>
+        <p:nvSpPr>
+          <p:cNvPr id="4" name="Footer Placeholder 3"/>
+          <p:cNvSpPr>
+            <a:spLocks noGrp="1"/>
+          </p:cNvSpPr>
+          <p:nvPr>
+            <p:ph type="ftr" sz="quarter" idx="11"/>
+          </p:nvPr>
+        </p:nvSpPr>
+        <p:spPr/>
+        <p:txBody>
+          <a:bodyPr/>
+          <a:lstStyle/>
+          <a:p>
+            <a:r>
+              <a:rPr lang="en-US" smtClean="0"/>
+              <a:t>Palle Cogburn</a:t>
+            </a:r>
+            <a:endParaRPr lang="en-US" dirty="0"/>
+          </a:p>
+        </p:txBody>
+      </p:sp>
+      <p:sp>
+        <p:nvSpPr>
+          <p:cNvPr id="5" name="Slide Number Placeholder 4"/>
+          <p:cNvSpPr>
+            <a:spLocks noGrp="1"/>
+          </p:cNvSpPr>
+          <p:nvPr>
+            <p:ph type="sldNum" sz="quarter" idx="12"/>
+          </p:nvPr>
+        </p:nvSpPr>
+        <p:spPr/>
+        <p:txBody>
+          <a:bodyPr/>
+          <a:lstStyle/>
+          <a:p>
+            <a:fld id="{8CBEA7D5-4322-4BC9-B527-2F0B772A1C61}" type="slidenum">
+              <a:rPr lang="en-US" smtClean="0"/>
+              <a:t>47</a:t>
+            </a:fld>
+            <a:endParaRPr lang="en-US" dirty="0"/>
+          </a:p>
+        </p:txBody>
+      </p:sp>
+      <p:pic>
+        <p:nvPicPr>
+          <p:cNvPr id="4098" name="Picture 2"/>
+          <p:cNvPicPr>
+            <a:picLocks noChangeAspect="1" noChangeArrowheads="1"/>
+          </p:cNvPicPr>
+          <p:nvPr/>
+        </p:nvPicPr>
+        <p:blipFill>
+          <a:blip r:embed="rId2">
+            <a:extLst>
+              <a:ext uri="{28A0092B-C50C-407E-A947-70E740481C1C}">
+                <a14:useLocalDpi xmlns:a14="http://schemas.microsoft.com/office/drawing/2010/main" val="0"/>
+              </a:ext>
+            </a:extLst>
+          </a:blip>
+          <a:srcRect/>
+          <a:stretch>
+            <a:fillRect/>
+          </a:stretch>
+        </p:blipFill>
+        <p:spPr bwMode="auto">
+          <a:xfrm>
+            <a:off x="3105150" y="1362075"/>
+            <a:ext cx="2933700" cy="4133850"/>
+          </a:xfrm>
+          <a:prstGeom prst="rect">
+            <a:avLst/>
+          </a:prstGeom>
+          <a:noFill/>
+          <a:ln>
+            <a:noFill/>
+          </a:ln>
+          <a:extLst>
+            <a:ext uri="{909E8E84-426E-40DD-AFC4-6F175D3DCCD1}">
+              <a14:hiddenFill xmlns:a14="http://schemas.microsoft.com/office/drawing/2010/main">
+                <a:solidFill>
+                  <a:schemeClr val="accent1"/>
+                </a:solidFill>
+              </a14:hiddenFill>
+            </a:ext>
+            <a:ext uri="{91240B29-F687-4F45-9708-019B960494DF}">
+              <a14:hiddenLine xmlns:a14="http://schemas.microsoft.com/office/drawing/2010/main" w="9525">
+                <a:solidFill>
+                  <a:schemeClr val="tx1"/>
+                </a:solidFill>
+                <a:miter lim="800000"/>
+                <a:headEnd/>
+                <a:tailEnd/>
+              </a14:hiddenLine>
+            </a:ext>
+          </a:extLst>
+        </p:spPr>
+      </p:pic>
+    </p:spTree>
+    <p:extLst>
+      <p:ext uri="{BB962C8B-B14F-4D97-AF65-F5344CB8AC3E}">
+        <p14:creationId xmlns:p14="http://schemas.microsoft.com/office/powerpoint/2010/main" val="679683882"/>
+      </p:ext>
+    </p:extLst>
+  </p:cSld>
+  <p:clrMapOvr>
+    <a:masterClrMapping/>
+  </p:clrMapOvr>
+  <p:timing>
+    <p:tnLst>
+      <p:par>
+        <p:cTn id="1" dur="indefinite" restart="never" nodeType="tmRoot"/>
+      </p:par>
+    </p:tnLst>
+  </p:timing>
+</p:sld>
+</file>
+
+<file path=ppt/slides/slide48.xml><?xml version="1.0" encoding="utf-8"?>
+<p:sld xmlns:a="http://schemas.openxmlformats.org/drawingml/2006/main" xmlns:r="http://schemas.openxmlformats.org/officeDocument/2006/relationships" xmlns:p="http://schemas.openxmlformats.org/presentationml/2006/main">
+  <p:cSld>
+    <p:spTree>
+      <p:nvGrpSpPr>
+        <p:cNvPr id="1" name=""/>
+        <p:cNvGrpSpPr/>
+        <p:nvPr/>
+      </p:nvGrpSpPr>
+      <p:grpSpPr>
+        <a:xfrm>
+          <a:off x="0" y="0"/>
+          <a:ext cx="0" cy="0"/>
+          <a:chOff x="0" y="0"/>
+          <a:chExt cx="0" cy="0"/>
+        </a:xfrm>
+      </p:grpSpPr>
+      <p:sp>
+        <p:nvSpPr>
+          <p:cNvPr id="2" name="Title 1"/>
+          <p:cNvSpPr>
+            <a:spLocks noGrp="1"/>
+          </p:cNvSpPr>
+          <p:nvPr>
+            <p:ph type="title"/>
+          </p:nvPr>
+        </p:nvSpPr>
+        <p:spPr/>
+        <p:txBody>
+          <a:bodyPr/>
+          <a:lstStyle/>
+          <a:p>
+            <a:r>
+              <a:rPr lang="en-US" dirty="0" smtClean="0"/>
+              <a:t>Push</a:t>
+            </a:r>
+            <a:endParaRPr lang="en-US" dirty="0"/>
+          </a:p>
+        </p:txBody>
+      </p:sp>
+      <p:sp>
+        <p:nvSpPr>
+          <p:cNvPr id="3" name="Date Placeholder 2"/>
+          <p:cNvSpPr>
+            <a:spLocks noGrp="1"/>
+          </p:cNvSpPr>
+          <p:nvPr>
+            <p:ph type="dt" sz="half" idx="10"/>
+          </p:nvPr>
+        </p:nvSpPr>
+        <p:spPr/>
+        <p:txBody>
+          <a:bodyPr/>
+          <a:lstStyle/>
+          <a:p>
+            <a:fld id="{C04B6024-2702-49B2-98BA-BAE3D8979AA9}" type="datetime2">
+              <a:rPr lang="en-US" smtClean="0"/>
+              <a:t>Friday, May 02, 2014</a:t>
+            </a:fld>
+            <a:endParaRPr lang="en-US" dirty="0"/>
+          </a:p>
+        </p:txBody>
+      </p:sp>
+      <p:sp>
+        <p:nvSpPr>
+          <p:cNvPr id="4" name="Footer Placeholder 3"/>
+          <p:cNvSpPr>
+            <a:spLocks noGrp="1"/>
+          </p:cNvSpPr>
+          <p:nvPr>
+            <p:ph type="ftr" sz="quarter" idx="11"/>
+          </p:nvPr>
+        </p:nvSpPr>
+        <p:spPr/>
+        <p:txBody>
+          <a:bodyPr/>
+          <a:lstStyle/>
+          <a:p>
+            <a:r>
+              <a:rPr lang="en-US" smtClean="0"/>
+              <a:t>Palle Cogburn</a:t>
+            </a:r>
+            <a:endParaRPr lang="en-US" dirty="0"/>
+          </a:p>
+        </p:txBody>
+      </p:sp>
+      <p:sp>
+        <p:nvSpPr>
+          <p:cNvPr id="5" name="Slide Number Placeholder 4"/>
+          <p:cNvSpPr>
+            <a:spLocks noGrp="1"/>
+          </p:cNvSpPr>
+          <p:nvPr>
+            <p:ph type="sldNum" sz="quarter" idx="12"/>
+          </p:nvPr>
+        </p:nvSpPr>
+        <p:spPr/>
+        <p:txBody>
+          <a:bodyPr/>
+          <a:lstStyle/>
+          <a:p>
+            <a:fld id="{8CBEA7D5-4322-4BC9-B527-2F0B772A1C61}" type="slidenum">
+              <a:rPr lang="en-US" smtClean="0"/>
+              <a:t>48</a:t>
+            </a:fld>
+            <a:endParaRPr lang="en-US" dirty="0"/>
+          </a:p>
+        </p:txBody>
+      </p:sp>
+      <p:pic>
+        <p:nvPicPr>
+          <p:cNvPr id="5122" name="Picture 2"/>
+          <p:cNvPicPr>
+            <a:picLocks noChangeAspect="1" noChangeArrowheads="1"/>
+          </p:cNvPicPr>
+          <p:nvPr/>
+        </p:nvPicPr>
+        <p:blipFill>
+          <a:blip r:embed="rId2">
+            <a:extLst>
+              <a:ext uri="{28A0092B-C50C-407E-A947-70E740481C1C}">
+                <a14:useLocalDpi xmlns:a14="http://schemas.microsoft.com/office/drawing/2010/main" val="0"/>
+              </a:ext>
+            </a:extLst>
+          </a:blip>
+          <a:srcRect/>
+          <a:stretch>
+            <a:fillRect/>
+          </a:stretch>
+        </p:blipFill>
+        <p:spPr bwMode="auto">
+          <a:xfrm>
+            <a:off x="1900238" y="1814513"/>
+            <a:ext cx="5343525" cy="3228975"/>
+          </a:xfrm>
+          <a:prstGeom prst="rect">
+            <a:avLst/>
+          </a:prstGeom>
+          <a:noFill/>
+          <a:ln>
+            <a:noFill/>
+          </a:ln>
+          <a:extLst>
+            <a:ext uri="{909E8E84-426E-40DD-AFC4-6F175D3DCCD1}">
+              <a14:hiddenFill xmlns:a14="http://schemas.microsoft.com/office/drawing/2010/main">
+                <a:solidFill>
+                  <a:schemeClr val="accent1"/>
+                </a:solidFill>
+              </a14:hiddenFill>
+            </a:ext>
+            <a:ext uri="{91240B29-F687-4F45-9708-019B960494DF}">
+              <a14:hiddenLine xmlns:a14="http://schemas.microsoft.com/office/drawing/2010/main" w="9525">
+                <a:solidFill>
+                  <a:schemeClr val="tx1"/>
+                </a:solidFill>
+                <a:miter lim="800000"/>
+                <a:headEnd/>
+                <a:tailEnd/>
+              </a14:hiddenLine>
+            </a:ext>
+          </a:extLst>
+        </p:spPr>
+      </p:pic>
+      <p:sp>
+        <p:nvSpPr>
+          <p:cNvPr id="6" name="Down Arrow 5"/>
+          <p:cNvSpPr/>
+          <p:nvPr/>
+        </p:nvSpPr>
+        <p:spPr>
+          <a:xfrm>
+            <a:off x="4953000" y="3657600"/>
+            <a:ext cx="533400" cy="533400"/>
+          </a:xfrm>
+          <a:prstGeom prst="downArrow">
+            <a:avLst/>
+          </a:prstGeom>
+          <a:noFill/>
+          <a:ln>
+            <a:solidFill>
+              <a:srgbClr val="FF0000"/>
+            </a:solidFill>
+          </a:ln>
+        </p:spPr>
+        <p:style>
+          <a:lnRef idx="2">
+            <a:schemeClr val="accent1">
+              <a:shade val="50000"/>
+            </a:schemeClr>
+          </a:lnRef>
+          <a:fillRef idx="1">
+            <a:schemeClr val="accent1"/>
+          </a:fillRef>
+          <a:effectRef idx="0">
+            <a:schemeClr val="accent1"/>
+          </a:effectRef>
+          <a:fontRef idx="minor">
+            <a:schemeClr val="lt1"/>
+          </a:fontRef>
+        </p:style>
+        <p:txBody>
+          <a:bodyPr rtlCol="0" anchor="ctr"/>
+          <a:lstStyle/>
+          <a:p>
+            <a:pPr algn="ctr"/>
+            <a:endParaRPr lang="en-US"/>
+          </a:p>
+        </p:txBody>
+      </p:sp>
+      <p:sp>
+        <p:nvSpPr>
+          <p:cNvPr id="7" name="TextBox 6"/>
+          <p:cNvSpPr txBox="1"/>
+          <p:nvPr/>
+        </p:nvSpPr>
+        <p:spPr>
+          <a:xfrm>
+            <a:off x="5546434" y="3739634"/>
+            <a:ext cx="1545167" cy="369332"/>
+          </a:xfrm>
+          <a:prstGeom prst="rect">
+            <a:avLst/>
+          </a:prstGeom>
+          <a:noFill/>
+        </p:spPr>
+        <p:txBody>
+          <a:bodyPr wrap="none" rtlCol="0">
+            <a:spAutoFit/>
+          </a:bodyPr>
+          <a:lstStyle/>
+          <a:p>
+            <a:r>
+              <a:rPr lang="en-US" dirty="0" smtClean="0"/>
+              <a:t>Drag and Drop</a:t>
+            </a:r>
+            <a:endParaRPr lang="en-US" dirty="0"/>
+          </a:p>
+        </p:txBody>
+      </p:sp>
+    </p:spTree>
+    <p:extLst>
+      <p:ext uri="{BB962C8B-B14F-4D97-AF65-F5344CB8AC3E}">
+        <p14:creationId xmlns:p14="http://schemas.microsoft.com/office/powerpoint/2010/main" val="3321005227"/>
+      </p:ext>
+    </p:extLst>
+  </p:cSld>
+  <p:clrMapOvr>
+    <a:masterClrMapping/>
+  </p:clrMapOvr>
+  <p:timing>
+    <p:tnLst>
+      <p:par>
+        <p:cTn id="1" dur="indefinite" restart="never" nodeType="tmRoot"/>
+      </p:par>
+    </p:tnLst>
+  </p:timing>
+</p:sld>
+</file>
+
+<file path=ppt/slides/slide49.xml><?xml version="1.0" encoding="utf-8"?>
+<p:sld xmlns:a="http://schemas.openxmlformats.org/drawingml/2006/main" xmlns:r="http://schemas.openxmlformats.org/officeDocument/2006/relationships" xmlns:p="http://schemas.openxmlformats.org/presentationml/2006/main">
+  <p:cSld>
+    <p:spTree>
+      <p:nvGrpSpPr>
+        <p:cNvPr id="1" name=""/>
+        <p:cNvGrpSpPr/>
+        <p:nvPr/>
+      </p:nvGrpSpPr>
+      <p:grpSpPr>
+        <a:xfrm>
+          <a:off x="0" y="0"/>
+          <a:ext cx="0" cy="0"/>
+          <a:chOff x="0" y="0"/>
+          <a:chExt cx="0" cy="0"/>
+        </a:xfrm>
+      </p:grpSpPr>
+      <p:sp>
+        <p:nvSpPr>
+          <p:cNvPr id="2" name="Title 1"/>
+          <p:cNvSpPr>
+            <a:spLocks noGrp="1"/>
+          </p:cNvSpPr>
+          <p:nvPr>
+            <p:ph type="title"/>
+          </p:nvPr>
+        </p:nvSpPr>
+        <p:spPr/>
+        <p:txBody>
+          <a:bodyPr/>
+          <a:lstStyle/>
+          <a:p>
+            <a:r>
+              <a:rPr lang="en-US" dirty="0" smtClean="0"/>
+              <a:t>Push</a:t>
+            </a:r>
+            <a:endParaRPr lang="en-US" dirty="0"/>
+          </a:p>
+        </p:txBody>
+      </p:sp>
+      <p:sp>
+        <p:nvSpPr>
+          <p:cNvPr id="3" name="Date Placeholder 2"/>
+          <p:cNvSpPr>
+            <a:spLocks noGrp="1"/>
+          </p:cNvSpPr>
+          <p:nvPr>
+            <p:ph type="dt" sz="half" idx="10"/>
+          </p:nvPr>
+        </p:nvSpPr>
+        <p:spPr/>
+        <p:txBody>
+          <a:bodyPr/>
+          <a:lstStyle/>
+          <a:p>
+            <a:fld id="{C04B6024-2702-49B2-98BA-BAE3D8979AA9}" type="datetime2">
+              <a:rPr lang="en-US" smtClean="0"/>
+              <a:t>Friday, May 02, 2014</a:t>
+            </a:fld>
+            <a:endParaRPr lang="en-US" dirty="0"/>
+          </a:p>
+        </p:txBody>
+      </p:sp>
+      <p:sp>
+        <p:nvSpPr>
+          <p:cNvPr id="4" name="Footer Placeholder 3"/>
+          <p:cNvSpPr>
+            <a:spLocks noGrp="1"/>
+          </p:cNvSpPr>
+          <p:nvPr>
+            <p:ph type="ftr" sz="quarter" idx="11"/>
+          </p:nvPr>
+        </p:nvSpPr>
+        <p:spPr/>
+        <p:txBody>
+          <a:bodyPr/>
+          <a:lstStyle/>
+          <a:p>
+            <a:r>
+              <a:rPr lang="en-US" smtClean="0"/>
+              <a:t>Palle Cogburn</a:t>
+            </a:r>
+            <a:endParaRPr lang="en-US" dirty="0"/>
+          </a:p>
+        </p:txBody>
+      </p:sp>
+      <p:sp>
+        <p:nvSpPr>
+          <p:cNvPr id="5" name="Slide Number Placeholder 4"/>
+          <p:cNvSpPr>
+            <a:spLocks noGrp="1"/>
+          </p:cNvSpPr>
+          <p:nvPr>
+            <p:ph type="sldNum" sz="quarter" idx="12"/>
+          </p:nvPr>
+        </p:nvSpPr>
+        <p:spPr/>
+        <p:txBody>
+          <a:bodyPr/>
+          <a:lstStyle/>
+          <a:p>
+            <a:fld id="{8CBEA7D5-4322-4BC9-B527-2F0B772A1C61}" type="slidenum">
+              <a:rPr lang="en-US" smtClean="0"/>
+              <a:t>49</a:t>
+            </a:fld>
+            <a:endParaRPr lang="en-US" dirty="0"/>
+          </a:p>
+        </p:txBody>
+      </p:sp>
+      <p:pic>
+        <p:nvPicPr>
+          <p:cNvPr id="6146" name="Picture 2"/>
+          <p:cNvPicPr>
+            <a:picLocks noChangeAspect="1" noChangeArrowheads="1"/>
+          </p:cNvPicPr>
+          <p:nvPr/>
+        </p:nvPicPr>
+        <p:blipFill>
+          <a:blip r:embed="rId2">
+            <a:extLst>
+              <a:ext uri="{28A0092B-C50C-407E-A947-70E740481C1C}">
+                <a14:useLocalDpi xmlns:a14="http://schemas.microsoft.com/office/drawing/2010/main" val="0"/>
+              </a:ext>
+            </a:extLst>
+          </a:blip>
+          <a:srcRect/>
+          <a:stretch>
+            <a:fillRect/>
+          </a:stretch>
+        </p:blipFill>
+        <p:spPr bwMode="auto">
+          <a:xfrm>
+            <a:off x="1981200" y="2266950"/>
+            <a:ext cx="5181600" cy="2324100"/>
+          </a:xfrm>
+          <a:prstGeom prst="rect">
+            <a:avLst/>
+          </a:prstGeom>
+          <a:noFill/>
+          <a:ln>
+            <a:noFill/>
+          </a:ln>
+          <a:extLst>
+            <a:ext uri="{909E8E84-426E-40DD-AFC4-6F175D3DCCD1}">
+              <a14:hiddenFill xmlns:a14="http://schemas.microsoft.com/office/drawing/2010/main">
+                <a:solidFill>
+                  <a:schemeClr val="accent1"/>
+                </a:solidFill>
+              </a14:hiddenFill>
+            </a:ext>
+            <a:ext uri="{91240B29-F687-4F45-9708-019B960494DF}">
+              <a14:hiddenLine xmlns:a14="http://schemas.microsoft.com/office/drawing/2010/main" w="9525">
+                <a:solidFill>
+                  <a:schemeClr val="tx1"/>
+                </a:solidFill>
+                <a:miter lim="800000"/>
+                <a:headEnd/>
+                <a:tailEnd/>
+              </a14:hiddenLine>
+            </a:ext>
+          </a:extLst>
+        </p:spPr>
+      </p:pic>
+    </p:spTree>
+    <p:extLst>
+      <p:ext uri="{BB962C8B-B14F-4D97-AF65-F5344CB8AC3E}">
+        <p14:creationId xmlns:p14="http://schemas.microsoft.com/office/powerpoint/2010/main" val="742504968"/>
+      </p:ext>
+    </p:extLst>
+  </p:cSld>
+  <p:clrMapOvr>
+    <a:masterClrMapping/>
+  </p:clrMapOvr>
+  <p:timing>
+    <p:tnLst>
+      <p:par>
+        <p:cTn id="1" dur="indefinite" restart="never" nodeType="tmRoot"/>
+      </p:par>
+    </p:tnLst>
+  </p:timing>
+</p:sld>
+</file>
+
 <file path=ppt/slides/slide5.xml><?xml version="1.0" encoding="utf-8"?>
 <p:sld xmlns:a="http://schemas.openxmlformats.org/drawingml/2006/main" xmlns:r="http://schemas.openxmlformats.org/officeDocument/2006/relationships" xmlns:p="http://schemas.openxmlformats.org/presentationml/2006/main">
   <p:cSld>
@@ -9672,7 +13592,7 @@
           <a:p>
             <a:fld id="{C04B6024-2702-49B2-98BA-BAE3D8979AA9}" type="datetime2">
               <a:rPr lang="en-US" smtClean="0"/>
-              <a:t>Monday, April 28, 2014</a:t>
+              <a:t>Friday, May 02, 2014</a:t>
             </a:fld>
             <a:endParaRPr lang="en-US" dirty="0"/>
           </a:p>
@@ -9798,6 +13718,372 @@
 </p:sld>
 </file>
 
+<file path=ppt/slides/slide50.xml><?xml version="1.0" encoding="utf-8"?>
+<p:sld xmlns:a="http://schemas.openxmlformats.org/drawingml/2006/main" xmlns:r="http://schemas.openxmlformats.org/officeDocument/2006/relationships" xmlns:p="http://schemas.openxmlformats.org/presentationml/2006/main">
+  <p:cSld>
+    <p:spTree>
+      <p:nvGrpSpPr>
+        <p:cNvPr id="1" name=""/>
+        <p:cNvGrpSpPr/>
+        <p:nvPr/>
+      </p:nvGrpSpPr>
+      <p:grpSpPr>
+        <a:xfrm>
+          <a:off x="0" y="0"/>
+          <a:ext cx="0" cy="0"/>
+          <a:chOff x="0" y="0"/>
+          <a:chExt cx="0" cy="0"/>
+        </a:xfrm>
+      </p:grpSpPr>
+      <p:sp>
+        <p:nvSpPr>
+          <p:cNvPr id="2" name="Title 1"/>
+          <p:cNvSpPr>
+            <a:spLocks noGrp="1"/>
+          </p:cNvSpPr>
+          <p:nvPr>
+            <p:ph type="title"/>
+          </p:nvPr>
+        </p:nvSpPr>
+        <p:spPr/>
+        <p:txBody>
+          <a:bodyPr/>
+          <a:lstStyle/>
+          <a:p>
+            <a:r>
+              <a:rPr lang="en-US" dirty="0" smtClean="0"/>
+              <a:t>Push</a:t>
+            </a:r>
+            <a:endParaRPr lang="en-US" dirty="0"/>
+          </a:p>
+        </p:txBody>
+      </p:sp>
+      <p:sp>
+        <p:nvSpPr>
+          <p:cNvPr id="3" name="Date Placeholder 2"/>
+          <p:cNvSpPr>
+            <a:spLocks noGrp="1"/>
+          </p:cNvSpPr>
+          <p:nvPr>
+            <p:ph type="dt" sz="half" idx="10"/>
+          </p:nvPr>
+        </p:nvSpPr>
+        <p:spPr/>
+        <p:txBody>
+          <a:bodyPr/>
+          <a:lstStyle/>
+          <a:p>
+            <a:fld id="{C04B6024-2702-49B2-98BA-BAE3D8979AA9}" type="datetime2">
+              <a:rPr lang="en-US" smtClean="0"/>
+              <a:t>Friday, May 02, 2014</a:t>
+            </a:fld>
+            <a:endParaRPr lang="en-US" dirty="0"/>
+          </a:p>
+        </p:txBody>
+      </p:sp>
+      <p:sp>
+        <p:nvSpPr>
+          <p:cNvPr id="4" name="Footer Placeholder 3"/>
+          <p:cNvSpPr>
+            <a:spLocks noGrp="1"/>
+          </p:cNvSpPr>
+          <p:nvPr>
+            <p:ph type="ftr" sz="quarter" idx="11"/>
+          </p:nvPr>
+        </p:nvSpPr>
+        <p:spPr/>
+        <p:txBody>
+          <a:bodyPr/>
+          <a:lstStyle/>
+          <a:p>
+            <a:r>
+              <a:rPr lang="en-US" smtClean="0"/>
+              <a:t>Palle Cogburn</a:t>
+            </a:r>
+            <a:endParaRPr lang="en-US" dirty="0"/>
+          </a:p>
+        </p:txBody>
+      </p:sp>
+      <p:sp>
+        <p:nvSpPr>
+          <p:cNvPr id="5" name="Slide Number Placeholder 4"/>
+          <p:cNvSpPr>
+            <a:spLocks noGrp="1"/>
+          </p:cNvSpPr>
+          <p:nvPr>
+            <p:ph type="sldNum" sz="quarter" idx="12"/>
+          </p:nvPr>
+        </p:nvSpPr>
+        <p:spPr/>
+        <p:txBody>
+          <a:bodyPr/>
+          <a:lstStyle/>
+          <a:p>
+            <a:fld id="{8CBEA7D5-4322-4BC9-B527-2F0B772A1C61}" type="slidenum">
+              <a:rPr lang="en-US" smtClean="0"/>
+              <a:t>50</a:t>
+            </a:fld>
+            <a:endParaRPr lang="en-US" dirty="0"/>
+          </a:p>
+        </p:txBody>
+      </p:sp>
+      <p:pic>
+        <p:nvPicPr>
+          <p:cNvPr id="7170" name="Picture 2"/>
+          <p:cNvPicPr>
+            <a:picLocks noChangeAspect="1" noChangeArrowheads="1"/>
+          </p:cNvPicPr>
+          <p:nvPr/>
+        </p:nvPicPr>
+        <p:blipFill>
+          <a:blip r:embed="rId2">
+            <a:extLst>
+              <a:ext uri="{28A0092B-C50C-407E-A947-70E740481C1C}">
+                <a14:useLocalDpi xmlns:a14="http://schemas.microsoft.com/office/drawing/2010/main" val="0"/>
+              </a:ext>
+            </a:extLst>
+          </a:blip>
+          <a:srcRect/>
+          <a:stretch>
+            <a:fillRect/>
+          </a:stretch>
+        </p:blipFill>
+        <p:spPr bwMode="auto">
+          <a:xfrm>
+            <a:off x="1385888" y="1524000"/>
+            <a:ext cx="6372225" cy="4362450"/>
+          </a:xfrm>
+          <a:prstGeom prst="rect">
+            <a:avLst/>
+          </a:prstGeom>
+          <a:noFill/>
+          <a:ln>
+            <a:noFill/>
+          </a:ln>
+          <a:extLst>
+            <a:ext uri="{909E8E84-426E-40DD-AFC4-6F175D3DCCD1}">
+              <a14:hiddenFill xmlns:a14="http://schemas.microsoft.com/office/drawing/2010/main">
+                <a:solidFill>
+                  <a:schemeClr val="accent1"/>
+                </a:solidFill>
+              </a14:hiddenFill>
+            </a:ext>
+            <a:ext uri="{91240B29-F687-4F45-9708-019B960494DF}">
+              <a14:hiddenLine xmlns:a14="http://schemas.microsoft.com/office/drawing/2010/main" w="9525">
+                <a:solidFill>
+                  <a:schemeClr val="tx1"/>
+                </a:solidFill>
+                <a:miter lim="800000"/>
+                <a:headEnd/>
+                <a:tailEnd/>
+              </a14:hiddenLine>
+            </a:ext>
+          </a:extLst>
+        </p:spPr>
+      </p:pic>
+    </p:spTree>
+    <p:extLst>
+      <p:ext uri="{BB962C8B-B14F-4D97-AF65-F5344CB8AC3E}">
+        <p14:creationId xmlns:p14="http://schemas.microsoft.com/office/powerpoint/2010/main" val="984467784"/>
+      </p:ext>
+    </p:extLst>
+  </p:cSld>
+  <p:clrMapOvr>
+    <a:masterClrMapping/>
+  </p:clrMapOvr>
+  <p:timing>
+    <p:tnLst>
+      <p:par>
+        <p:cTn id="1" dur="indefinite" restart="never" nodeType="tmRoot"/>
+      </p:par>
+    </p:tnLst>
+  </p:timing>
+</p:sld>
+</file>
+
+<file path=ppt/slides/slide51.xml><?xml version="1.0" encoding="utf-8"?>
+<p:sld xmlns:a="http://schemas.openxmlformats.org/drawingml/2006/main" xmlns:r="http://schemas.openxmlformats.org/officeDocument/2006/relationships" xmlns:p="http://schemas.openxmlformats.org/presentationml/2006/main">
+  <p:cSld>
+    <p:spTree>
+      <p:nvGrpSpPr>
+        <p:cNvPr id="1" name=""/>
+        <p:cNvGrpSpPr/>
+        <p:nvPr/>
+      </p:nvGrpSpPr>
+      <p:grpSpPr>
+        <a:xfrm>
+          <a:off x="0" y="0"/>
+          <a:ext cx="0" cy="0"/>
+          <a:chOff x="0" y="0"/>
+          <a:chExt cx="0" cy="0"/>
+        </a:xfrm>
+      </p:grpSpPr>
+      <p:sp>
+        <p:nvSpPr>
+          <p:cNvPr id="2" name="Title 1"/>
+          <p:cNvSpPr>
+            <a:spLocks noGrp="1"/>
+          </p:cNvSpPr>
+          <p:nvPr>
+            <p:ph type="title"/>
+          </p:nvPr>
+        </p:nvSpPr>
+        <p:spPr/>
+        <p:txBody>
+          <a:bodyPr/>
+          <a:lstStyle/>
+          <a:p>
+            <a:r>
+              <a:rPr lang="en-US" dirty="0" smtClean="0"/>
+              <a:t>And there it is!</a:t>
+            </a:r>
+            <a:endParaRPr lang="en-US" dirty="0"/>
+          </a:p>
+        </p:txBody>
+      </p:sp>
+      <p:sp>
+        <p:nvSpPr>
+          <p:cNvPr id="3" name="Date Placeholder 2"/>
+          <p:cNvSpPr>
+            <a:spLocks noGrp="1"/>
+          </p:cNvSpPr>
+          <p:nvPr>
+            <p:ph type="dt" sz="half" idx="10"/>
+          </p:nvPr>
+        </p:nvSpPr>
+        <p:spPr/>
+        <p:txBody>
+          <a:bodyPr/>
+          <a:lstStyle/>
+          <a:p>
+            <a:fld id="{C04B6024-2702-49B2-98BA-BAE3D8979AA9}" type="datetime2">
+              <a:rPr lang="en-US" smtClean="0"/>
+              <a:t>Friday, May 02, 2014</a:t>
+            </a:fld>
+            <a:endParaRPr lang="en-US" dirty="0"/>
+          </a:p>
+        </p:txBody>
+      </p:sp>
+      <p:sp>
+        <p:nvSpPr>
+          <p:cNvPr id="4" name="Footer Placeholder 3"/>
+          <p:cNvSpPr>
+            <a:spLocks noGrp="1"/>
+          </p:cNvSpPr>
+          <p:nvPr>
+            <p:ph type="ftr" sz="quarter" idx="11"/>
+          </p:nvPr>
+        </p:nvSpPr>
+        <p:spPr/>
+        <p:txBody>
+          <a:bodyPr/>
+          <a:lstStyle/>
+          <a:p>
+            <a:r>
+              <a:rPr lang="en-US" smtClean="0"/>
+              <a:t>Palle Cogburn</a:t>
+            </a:r>
+            <a:endParaRPr lang="en-US" dirty="0"/>
+          </a:p>
+        </p:txBody>
+      </p:sp>
+      <p:sp>
+        <p:nvSpPr>
+          <p:cNvPr id="5" name="Slide Number Placeholder 4"/>
+          <p:cNvSpPr>
+            <a:spLocks noGrp="1"/>
+          </p:cNvSpPr>
+          <p:nvPr>
+            <p:ph type="sldNum" sz="quarter" idx="12"/>
+          </p:nvPr>
+        </p:nvSpPr>
+        <p:spPr/>
+        <p:txBody>
+          <a:bodyPr/>
+          <a:lstStyle/>
+          <a:p>
+            <a:fld id="{8CBEA7D5-4322-4BC9-B527-2F0B772A1C61}" type="slidenum">
+              <a:rPr lang="en-US" smtClean="0"/>
+              <a:t>51</a:t>
+            </a:fld>
+            <a:endParaRPr lang="en-US" dirty="0"/>
+          </a:p>
+        </p:txBody>
+      </p:sp>
+      <p:pic>
+        <p:nvPicPr>
+          <p:cNvPr id="8194" name="Picture 2"/>
+          <p:cNvPicPr>
+            <a:picLocks noChangeAspect="1" noChangeArrowheads="1"/>
+          </p:cNvPicPr>
+          <p:nvPr/>
+        </p:nvPicPr>
+        <p:blipFill>
+          <a:blip r:embed="rId2">
+            <a:extLst>
+              <a:ext uri="{28A0092B-C50C-407E-A947-70E740481C1C}">
+                <a14:useLocalDpi xmlns:a14="http://schemas.microsoft.com/office/drawing/2010/main" val="0"/>
+              </a:ext>
+            </a:extLst>
+          </a:blip>
+          <a:srcRect/>
+          <a:stretch>
+            <a:fillRect/>
+          </a:stretch>
+        </p:blipFill>
+        <p:spPr bwMode="auto">
+          <a:xfrm>
+            <a:off x="131445" y="2039730"/>
+            <a:ext cx="8982075" cy="2927558"/>
+          </a:xfrm>
+          <a:prstGeom prst="rect">
+            <a:avLst/>
+          </a:prstGeom>
+          <a:noFill/>
+          <a:ln>
+            <a:noFill/>
+          </a:ln>
+          <a:extLst>
+            <a:ext uri="{909E8E84-426E-40DD-AFC4-6F175D3DCCD1}">
+              <a14:hiddenFill xmlns:a14="http://schemas.microsoft.com/office/drawing/2010/main">
+                <a:solidFill>
+                  <a:schemeClr val="accent1"/>
+                </a:solidFill>
+              </a14:hiddenFill>
+            </a:ext>
+            <a:ext uri="{91240B29-F687-4F45-9708-019B960494DF}">
+              <a14:hiddenLine xmlns:a14="http://schemas.microsoft.com/office/drawing/2010/main" w="9525">
+                <a:solidFill>
+                  <a:schemeClr val="tx1"/>
+                </a:solidFill>
+                <a:miter lim="800000"/>
+                <a:headEnd/>
+                <a:tailEnd/>
+              </a14:hiddenLine>
+            </a:ext>
+          </a:extLst>
+        </p:spPr>
+      </p:pic>
+    </p:spTree>
+    <p:extLst>
+      <p:ext uri="{BB962C8B-B14F-4D97-AF65-F5344CB8AC3E}">
+        <p14:creationId xmlns:p14="http://schemas.microsoft.com/office/powerpoint/2010/main" val="2195017932"/>
+      </p:ext>
+    </p:extLst>
+  </p:cSld>
+  <p:clrMapOvr>
+    <a:masterClrMapping/>
+  </p:clrMapOvr>
+  <p:timing>
+    <p:tnLst>
+      <p:par>
+        <p:cTn id="1" dur="indefinite" restart="never" nodeType="tmRoot"/>
+      </p:par>
+    </p:tnLst>
+  </p:timing>
+</p:sld>
+</file>
+
 <file path=ppt/slides/slide6.xml><?xml version="1.0" encoding="utf-8"?>
 <p:sld xmlns:a="http://schemas.openxmlformats.org/drawingml/2006/main" xmlns:r="http://schemas.openxmlformats.org/officeDocument/2006/relationships" xmlns:p="http://schemas.openxmlformats.org/presentationml/2006/main">
   <p:cSld>
@@ -9855,7 +14141,7 @@
           <a:p>
             <a:fld id="{C04B6024-2702-49B2-98BA-BAE3D8979AA9}" type="datetime2">
               <a:rPr lang="en-US" smtClean="0"/>
-              <a:t>Monday, April 28, 2014</a:t>
+              <a:t>Friday, May 02, 2014</a:t>
             </a:fld>
             <a:endParaRPr lang="en-US" dirty="0"/>
           </a:p>
@@ -10038,7 +14324,7 @@
           <a:p>
             <a:fld id="{C04B6024-2702-49B2-98BA-BAE3D8979AA9}" type="datetime2">
               <a:rPr lang="en-US" smtClean="0"/>
-              <a:t>Monday, April 28, 2014</a:t>
+              <a:t>Friday, May 02, 2014</a:t>
             </a:fld>
             <a:endParaRPr lang="en-US" dirty="0"/>
           </a:p>
@@ -10221,7 +14507,7 @@
           <a:p>
             <a:fld id="{C04B6024-2702-49B2-98BA-BAE3D8979AA9}" type="datetime2">
               <a:rPr lang="en-US" smtClean="0"/>
-              <a:t>Monday, April 28, 2014</a:t>
+              <a:t>Friday, May 02, 2014</a:t>
             </a:fld>
             <a:endParaRPr lang="en-US" dirty="0"/>
           </a:p>
@@ -10480,7 +14766,7 @@
           <a:p>
             <a:fld id="{4B9D5BC9-690F-4431-B77E-275FD5243899}" type="datetime2">
               <a:rPr lang="en-US" smtClean="0"/>
-              <a:t>Monday, April 28, 2014</a:t>
+              <a:t>Friday, May 02, 2014</a:t>
             </a:fld>
             <a:endParaRPr lang="en-US" dirty="0"/>
           </a:p>

</xml_diff>